<commit_message>
map and autocomplete cities
</commit_message>
<xml_diff>
--- a/Gestion de projet/Analyse Eco-Planner.pptx
+++ b/Gestion de projet/Analyse Eco-Planner.pptx
@@ -6,13 +6,16 @@
   </p:sldMasterIdLst>
   <p:sldIdLst>
     <p:sldId id="256" r:id="rId2"/>
-    <p:sldId id="258" r:id="rId3"/>
-    <p:sldId id="257" r:id="rId4"/>
-    <p:sldId id="262" r:id="rId5"/>
-    <p:sldId id="263" r:id="rId6"/>
-    <p:sldId id="260" r:id="rId7"/>
-    <p:sldId id="261" r:id="rId8"/>
-    <p:sldId id="259" r:id="rId9"/>
+    <p:sldId id="264" r:id="rId3"/>
+    <p:sldId id="265" r:id="rId4"/>
+    <p:sldId id="266" r:id="rId5"/>
+    <p:sldId id="258" r:id="rId6"/>
+    <p:sldId id="257" r:id="rId7"/>
+    <p:sldId id="262" r:id="rId8"/>
+    <p:sldId id="263" r:id="rId9"/>
+    <p:sldId id="260" r:id="rId10"/>
+    <p:sldId id="261" r:id="rId11"/>
+    <p:sldId id="259" r:id="rId12"/>
   </p:sldIdLst>
   <p:sldSz cx="12192000" cy="6858000"/>
   <p:notesSz cx="6858000" cy="9144000"/>
@@ -268,7 +271,7 @@
           <a:p>
             <a:fld id="{7C31D911-437A-0244-845E-759FD4408A88}" type="datetimeFigureOut">
               <a:rPr lang="en-GB" smtClean="0"/>
-              <a:t>10/12/2024</a:t>
+              <a:t>14/12/2024</a:t>
             </a:fld>
             <a:endParaRPr lang="en-GB"/>
           </a:p>
@@ -468,7 +471,7 @@
           <a:p>
             <a:fld id="{7C31D911-437A-0244-845E-759FD4408A88}" type="datetimeFigureOut">
               <a:rPr lang="en-GB" smtClean="0"/>
-              <a:t>10/12/2024</a:t>
+              <a:t>14/12/2024</a:t>
             </a:fld>
             <a:endParaRPr lang="en-GB"/>
           </a:p>
@@ -678,7 +681,7 @@
           <a:p>
             <a:fld id="{7C31D911-437A-0244-845E-759FD4408A88}" type="datetimeFigureOut">
               <a:rPr lang="en-GB" smtClean="0"/>
-              <a:t>10/12/2024</a:t>
+              <a:t>14/12/2024</a:t>
             </a:fld>
             <a:endParaRPr lang="en-GB"/>
           </a:p>
@@ -878,7 +881,7 @@
           <a:p>
             <a:fld id="{7C31D911-437A-0244-845E-759FD4408A88}" type="datetimeFigureOut">
               <a:rPr lang="en-GB" smtClean="0"/>
-              <a:t>10/12/2024</a:t>
+              <a:t>14/12/2024</a:t>
             </a:fld>
             <a:endParaRPr lang="en-GB"/>
           </a:p>
@@ -1154,7 +1157,7 @@
           <a:p>
             <a:fld id="{7C31D911-437A-0244-845E-759FD4408A88}" type="datetimeFigureOut">
               <a:rPr lang="en-GB" smtClean="0"/>
-              <a:t>10/12/2024</a:t>
+              <a:t>14/12/2024</a:t>
             </a:fld>
             <a:endParaRPr lang="en-GB"/>
           </a:p>
@@ -1422,7 +1425,7 @@
           <a:p>
             <a:fld id="{7C31D911-437A-0244-845E-759FD4408A88}" type="datetimeFigureOut">
               <a:rPr lang="en-GB" smtClean="0"/>
-              <a:t>10/12/2024</a:t>
+              <a:t>14/12/2024</a:t>
             </a:fld>
             <a:endParaRPr lang="en-GB"/>
           </a:p>
@@ -1837,7 +1840,7 @@
           <a:p>
             <a:fld id="{7C31D911-437A-0244-845E-759FD4408A88}" type="datetimeFigureOut">
               <a:rPr lang="en-GB" smtClean="0"/>
-              <a:t>10/12/2024</a:t>
+              <a:t>14/12/2024</a:t>
             </a:fld>
             <a:endParaRPr lang="en-GB"/>
           </a:p>
@@ -1979,7 +1982,7 @@
           <a:p>
             <a:fld id="{7C31D911-437A-0244-845E-759FD4408A88}" type="datetimeFigureOut">
               <a:rPr lang="en-GB" smtClean="0"/>
-              <a:t>10/12/2024</a:t>
+              <a:t>14/12/2024</a:t>
             </a:fld>
             <a:endParaRPr lang="en-GB"/>
           </a:p>
@@ -2092,7 +2095,7 @@
           <a:p>
             <a:fld id="{7C31D911-437A-0244-845E-759FD4408A88}" type="datetimeFigureOut">
               <a:rPr lang="en-GB" smtClean="0"/>
-              <a:t>10/12/2024</a:t>
+              <a:t>14/12/2024</a:t>
             </a:fld>
             <a:endParaRPr lang="en-GB"/>
           </a:p>
@@ -2405,7 +2408,7 @@
           <a:p>
             <a:fld id="{7C31D911-437A-0244-845E-759FD4408A88}" type="datetimeFigureOut">
               <a:rPr lang="en-GB" smtClean="0"/>
-              <a:t>10/12/2024</a:t>
+              <a:t>14/12/2024</a:t>
             </a:fld>
             <a:endParaRPr lang="en-GB"/>
           </a:p>
@@ -2694,7 +2697,7 @@
           <a:p>
             <a:fld id="{7C31D911-437A-0244-845E-759FD4408A88}" type="datetimeFigureOut">
               <a:rPr lang="en-GB" smtClean="0"/>
-              <a:t>10/12/2024</a:t>
+              <a:t>14/12/2024</a:t>
             </a:fld>
             <a:endParaRPr lang="en-GB"/>
           </a:p>
@@ -2937,7 +2940,7 @@
           <a:p>
             <a:fld id="{7C31D911-437A-0244-845E-759FD4408A88}" type="datetimeFigureOut">
               <a:rPr lang="en-GB" smtClean="0"/>
-              <a:t>10/12/2024</a:t>
+              <a:t>14/12/2024</a:t>
             </a:fld>
             <a:endParaRPr lang="en-GB"/>
           </a:p>
@@ -3376,12 +3379,8 @@
           <a:lstStyle/>
           <a:p>
             <a:r>
-              <a:rPr lang="en-GB" dirty="0"/>
-              <a:t>Analyse du </a:t>
-            </a:r>
-            <a:r>
               <a:rPr lang="en-GB" dirty="0" err="1"/>
-              <a:t>projet</a:t>
+              <a:t>EcoPlanner</a:t>
             </a:r>
             <a:endParaRPr lang="en-GB" dirty="0"/>
           </a:p>
@@ -3416,6 +3415,172 @@
     <p:extLst>
       <p:ext uri="{BB962C8B-B14F-4D97-AF65-F5344CB8AC3E}">
         <p14:creationId xmlns:p14="http://schemas.microsoft.com/office/powerpoint/2010/main" val="243267800"/>
+      </p:ext>
+    </p:extLst>
+  </p:cSld>
+  <p:clrMapOvr>
+    <a:masterClrMapping/>
+  </p:clrMapOvr>
+</p:sld>
+</file>
+
+<file path=ppt/slides/slide10.xml><?xml version="1.0" encoding="utf-8"?>
+<p:sld xmlns:a="http://schemas.openxmlformats.org/drawingml/2006/main" xmlns:r="http://schemas.openxmlformats.org/officeDocument/2006/relationships" xmlns:p="http://schemas.openxmlformats.org/presentationml/2006/main">
+  <p:cSld>
+    <p:spTree>
+      <p:nvGrpSpPr>
+        <p:cNvPr id="1" name=""/>
+        <p:cNvGrpSpPr/>
+        <p:nvPr/>
+      </p:nvGrpSpPr>
+      <p:grpSpPr>
+        <a:xfrm>
+          <a:off x="0" y="0"/>
+          <a:ext cx="0" cy="0"/>
+          <a:chOff x="0" y="0"/>
+          <a:chExt cx="0" cy="0"/>
+        </a:xfrm>
+      </p:grpSpPr>
+      <p:sp>
+        <p:nvSpPr>
+          <p:cNvPr id="2" name="Titre 1">
+            <a:extLst>
+              <a:ext uri="{FF2B5EF4-FFF2-40B4-BE49-F238E27FC236}">
+                <a16:creationId xmlns:a16="http://schemas.microsoft.com/office/drawing/2014/main" id="{D7BFB7CD-9CC0-1F24-7318-72C064958791}"/>
+              </a:ext>
+            </a:extLst>
+          </p:cNvPr>
+          <p:cNvSpPr>
+            <a:spLocks noGrp="1"/>
+          </p:cNvSpPr>
+          <p:nvPr>
+            <p:ph type="title"/>
+          </p:nvPr>
+        </p:nvSpPr>
+        <p:spPr/>
+        <p:txBody>
+          <a:bodyPr/>
+          <a:lstStyle/>
+          <a:p>
+            <a:r>
+              <a:rPr lang="en-GB" dirty="0"/>
+              <a:t>Analyse SWOT</a:t>
+            </a:r>
+          </a:p>
+        </p:txBody>
+      </p:sp>
+      <p:sp>
+        <p:nvSpPr>
+          <p:cNvPr id="3" name="Espace réservé du contenu 2">
+            <a:extLst>
+              <a:ext uri="{FF2B5EF4-FFF2-40B4-BE49-F238E27FC236}">
+                <a16:creationId xmlns:a16="http://schemas.microsoft.com/office/drawing/2014/main" id="{F2A7EF2D-6AC0-B65E-1B11-3CD3FD672C3D}"/>
+              </a:ext>
+            </a:extLst>
+          </p:cNvPr>
+          <p:cNvSpPr>
+            <a:spLocks noGrp="1"/>
+          </p:cNvSpPr>
+          <p:nvPr>
+            <p:ph idx="1"/>
+          </p:nvPr>
+        </p:nvSpPr>
+        <p:spPr/>
+        <p:txBody>
+          <a:bodyPr/>
+          <a:lstStyle/>
+          <a:p>
+            <a:endParaRPr lang="en-GB"/>
+          </a:p>
+        </p:txBody>
+      </p:sp>
+    </p:spTree>
+    <p:extLst>
+      <p:ext uri="{BB962C8B-B14F-4D97-AF65-F5344CB8AC3E}">
+        <p14:creationId xmlns:p14="http://schemas.microsoft.com/office/powerpoint/2010/main" val="2682887988"/>
+      </p:ext>
+    </p:extLst>
+  </p:cSld>
+  <p:clrMapOvr>
+    <a:masterClrMapping/>
+  </p:clrMapOvr>
+</p:sld>
+</file>
+
+<file path=ppt/slides/slide11.xml><?xml version="1.0" encoding="utf-8"?>
+<p:sld xmlns:a="http://schemas.openxmlformats.org/drawingml/2006/main" xmlns:r="http://schemas.openxmlformats.org/officeDocument/2006/relationships" xmlns:p="http://schemas.openxmlformats.org/presentationml/2006/main">
+  <p:cSld>
+    <p:spTree>
+      <p:nvGrpSpPr>
+        <p:cNvPr id="1" name=""/>
+        <p:cNvGrpSpPr/>
+        <p:nvPr/>
+      </p:nvGrpSpPr>
+      <p:grpSpPr>
+        <a:xfrm>
+          <a:off x="0" y="0"/>
+          <a:ext cx="0" cy="0"/>
+          <a:chOff x="0" y="0"/>
+          <a:chExt cx="0" cy="0"/>
+        </a:xfrm>
+      </p:grpSpPr>
+      <p:sp>
+        <p:nvSpPr>
+          <p:cNvPr id="2" name="Titre 1">
+            <a:extLst>
+              <a:ext uri="{FF2B5EF4-FFF2-40B4-BE49-F238E27FC236}">
+                <a16:creationId xmlns:a16="http://schemas.microsoft.com/office/drawing/2014/main" id="{807B7BC1-2ED1-E610-C704-8F8AA01953F8}"/>
+              </a:ext>
+            </a:extLst>
+          </p:cNvPr>
+          <p:cNvSpPr>
+            <a:spLocks noGrp="1"/>
+          </p:cNvSpPr>
+          <p:nvPr>
+            <p:ph type="title"/>
+          </p:nvPr>
+        </p:nvSpPr>
+        <p:spPr/>
+        <p:txBody>
+          <a:bodyPr/>
+          <a:lstStyle/>
+          <a:p>
+            <a:r>
+              <a:rPr lang="en-GB" dirty="0"/>
+              <a:t>Segmentation</a:t>
+            </a:r>
+          </a:p>
+        </p:txBody>
+      </p:sp>
+      <p:sp>
+        <p:nvSpPr>
+          <p:cNvPr id="3" name="Espace réservé du contenu 2">
+            <a:extLst>
+              <a:ext uri="{FF2B5EF4-FFF2-40B4-BE49-F238E27FC236}">
+                <a16:creationId xmlns:a16="http://schemas.microsoft.com/office/drawing/2014/main" id="{96E9D622-FFEB-D3EC-A12B-50721A608322}"/>
+              </a:ext>
+            </a:extLst>
+          </p:cNvPr>
+          <p:cNvSpPr>
+            <a:spLocks noGrp="1"/>
+          </p:cNvSpPr>
+          <p:nvPr>
+            <p:ph idx="1"/>
+          </p:nvPr>
+        </p:nvSpPr>
+        <p:spPr/>
+        <p:txBody>
+          <a:bodyPr/>
+          <a:lstStyle/>
+          <a:p>
+            <a:endParaRPr lang="en-GB"/>
+          </a:p>
+        </p:txBody>
+      </p:sp>
+    </p:spTree>
+    <p:extLst>
+      <p:ext uri="{BB962C8B-B14F-4D97-AF65-F5344CB8AC3E}">
+        <p14:creationId xmlns:p14="http://schemas.microsoft.com/office/powerpoint/2010/main" val="4209570013"/>
       </p:ext>
     </p:extLst>
   </p:cSld>
@@ -3447,7 +3612,7 @@
           <p:cNvPr id="2" name="Titre 1">
             <a:extLst>
               <a:ext uri="{FF2B5EF4-FFF2-40B4-BE49-F238E27FC236}">
-                <a16:creationId xmlns:a16="http://schemas.microsoft.com/office/drawing/2014/main" id="{C6924090-EFD5-0FD0-7683-2B56E0B1E12B}"/>
+                <a16:creationId xmlns:a16="http://schemas.microsoft.com/office/drawing/2014/main" id="{671313D2-C570-4F3D-0E27-017FC5537FC9}"/>
               </a:ext>
             </a:extLst>
           </p:cNvPr>
@@ -3465,13 +3630,8 @@
           <a:p>
             <a:r>
               <a:rPr lang="en-GB" dirty="0"/>
-              <a:t>Analyse des </a:t>
-            </a:r>
-            <a:r>
-              <a:rPr lang="en-GB" dirty="0" err="1"/>
-              <a:t>besoins</a:t>
-            </a:r>
-            <a:endParaRPr lang="en-GB" dirty="0"/>
+              <a:t>I. Description</a:t>
+            </a:r>
           </a:p>
         </p:txBody>
       </p:sp>
@@ -3480,7 +3640,7 @@
           <p:cNvPr id="3" name="Espace réservé du contenu 2">
             <a:extLst>
               <a:ext uri="{FF2B5EF4-FFF2-40B4-BE49-F238E27FC236}">
-                <a16:creationId xmlns:a16="http://schemas.microsoft.com/office/drawing/2014/main" id="{92AB529C-2F84-2C3D-6B19-2CA49FB365FB}"/>
+                <a16:creationId xmlns:a16="http://schemas.microsoft.com/office/drawing/2014/main" id="{0D724DB5-71EA-A774-A73F-2981F17D4E1B}"/>
               </a:ext>
             </a:extLst>
           </p:cNvPr>
@@ -3493,142 +3653,87 @@
         </p:nvSpPr>
         <p:spPr/>
         <p:txBody>
-          <a:bodyPr/>
-          <a:lstStyle/>
-          <a:p>
-            <a:r>
-              <a:rPr lang="en-GB" dirty="0" err="1"/>
-              <a:t>Difficulté</a:t>
-            </a:r>
-            <a:r>
-              <a:rPr lang="en-GB" dirty="0"/>
-              <a:t> </a:t>
-            </a:r>
-            <a:r>
-              <a:rPr lang="en-GB" dirty="0" err="1"/>
-              <a:t>à</a:t>
-            </a:r>
-            <a:r>
-              <a:rPr lang="en-GB" dirty="0"/>
-              <a:t> </a:t>
-            </a:r>
-            <a:r>
-              <a:rPr lang="en-GB" dirty="0" err="1"/>
-              <a:t>obtenir</a:t>
-            </a:r>
-            <a:r>
-              <a:rPr lang="en-GB" dirty="0"/>
-              <a:t> </a:t>
-            </a:r>
-            <a:r>
-              <a:rPr lang="en-GB" dirty="0" err="1"/>
-              <a:t>une</a:t>
-            </a:r>
-            <a:r>
-              <a:rPr lang="en-GB" dirty="0"/>
-              <a:t> </a:t>
-            </a:r>
-            <a:r>
-              <a:rPr lang="en-GB" dirty="0" err="1"/>
-              <a:t>réponse</a:t>
-            </a:r>
-            <a:r>
-              <a:rPr lang="en-GB" dirty="0"/>
-              <a:t> exhaustive et </a:t>
-            </a:r>
-            <a:r>
-              <a:rPr lang="en-GB" dirty="0" err="1"/>
-              <a:t>fiable</a:t>
-            </a:r>
-            <a:r>
-              <a:rPr lang="en-GB" dirty="0"/>
-              <a:t> avec </a:t>
-            </a:r>
-            <a:r>
-              <a:rPr lang="en-GB" dirty="0" err="1"/>
-              <a:t>l’IA</a:t>
-            </a:r>
-            <a:endParaRPr lang="en-GB" dirty="0"/>
-          </a:p>
-          <a:p>
-            <a:r>
-              <a:rPr lang="en-GB" dirty="0" err="1"/>
-              <a:t>Volonté</a:t>
-            </a:r>
-            <a:r>
-              <a:rPr lang="en-GB" dirty="0"/>
-              <a:t> de </a:t>
-            </a:r>
-            <a:r>
-              <a:rPr lang="en-GB" dirty="0" err="1"/>
-              <a:t>réduire</a:t>
-            </a:r>
-            <a:r>
-              <a:rPr lang="en-GB" dirty="0"/>
-              <a:t> son impact </a:t>
-            </a:r>
-            <a:r>
-              <a:rPr lang="en-GB" dirty="0" err="1"/>
-              <a:t>carbone</a:t>
-            </a:r>
-            <a:endParaRPr lang="en-GB" dirty="0"/>
-          </a:p>
-          <a:p>
-            <a:r>
-              <a:rPr lang="en-GB" dirty="0" err="1"/>
-              <a:t>Volonté</a:t>
-            </a:r>
-            <a:r>
-              <a:rPr lang="en-GB" dirty="0"/>
-              <a:t> de voyager</a:t>
-            </a:r>
-          </a:p>
-          <a:p>
-            <a:r>
-              <a:rPr lang="en-GB" dirty="0" err="1"/>
-              <a:t>Volonté</a:t>
-            </a:r>
-            <a:r>
-              <a:rPr lang="en-GB" dirty="0"/>
-              <a:t> </a:t>
-            </a:r>
-            <a:r>
-              <a:rPr lang="en-GB"/>
-              <a:t>de local et </a:t>
-            </a:r>
-            <a:endParaRPr lang="en-GB" dirty="0"/>
-          </a:p>
-          <a:p>
-            <a:endParaRPr lang="en-GB" dirty="0"/>
-          </a:p>
-          <a:p>
-            <a:r>
-              <a:rPr lang="en-GB" dirty="0"/>
-              <a:t>To do: </a:t>
-            </a:r>
-            <a:r>
-              <a:rPr lang="en-GB" dirty="0" err="1"/>
-              <a:t>Réaliser</a:t>
-            </a:r>
-            <a:r>
-              <a:rPr lang="en-GB" dirty="0"/>
-              <a:t> sondage (google forms, type forms, </a:t>
-            </a:r>
-            <a:r>
-              <a:rPr lang="en-GB" dirty="0" err="1"/>
-              <a:t>usertesting</a:t>
-            </a:r>
-            <a:r>
-              <a:rPr lang="en-GB" dirty="0"/>
-              <a:t>)</a:t>
-            </a:r>
+          <a:bodyPr>
+            <a:normAutofit/>
+          </a:bodyPr>
+          <a:lstStyle/>
+          <a:p>
+            <a:pPr marL="0" indent="0" algn="ctr">
+              <a:buNone/>
+            </a:pPr>
+            <a:r>
+              <a:rPr lang="fr-FR" dirty="0"/>
+              <a:t>Nous proposons une interface qui permet de planifier un itinéraire de voyage en France à faible impact écologique sur mesure en fonction des gouts et besoins de chacun.</a:t>
+            </a:r>
+          </a:p>
+          <a:p>
+            <a:r>
+              <a:rPr lang="fr-FR" dirty="0"/>
+              <a:t>Pour qui ?</a:t>
+            </a:r>
+          </a:p>
+          <a:p>
+            <a:pPr marL="457200" lvl="1" indent="0">
+              <a:buNone/>
+            </a:pPr>
+            <a:r>
+              <a:rPr lang="fr-FR" dirty="0"/>
+              <a:t>1. Tous les voyageurs en France</a:t>
+            </a:r>
+          </a:p>
+          <a:p>
+            <a:pPr marL="457200" lvl="1" indent="0">
+              <a:buNone/>
+            </a:pPr>
+            <a:endParaRPr lang="fr-FR" dirty="0"/>
+          </a:p>
+          <a:p>
+            <a:r>
+              <a:rPr lang="fr-FR" dirty="0"/>
+              <a:t>Pour quoi ?</a:t>
+            </a:r>
+          </a:p>
+          <a:p>
+            <a:pPr marL="971550" lvl="1" indent="-514350">
+              <a:buFont typeface="+mj-lt"/>
+              <a:buAutoNum type="arabicPeriod"/>
+            </a:pPr>
+            <a:r>
+              <a:rPr lang="fr-FR" dirty="0"/>
+              <a:t>Faciliter le travail de planification des voyageurs éco-responsables</a:t>
+            </a:r>
+          </a:p>
+          <a:p>
+            <a:pPr marL="971550" lvl="1" indent="-514350">
+              <a:buFont typeface="+mj-lt"/>
+              <a:buAutoNum type="arabicPeriod"/>
+            </a:pPr>
+            <a:r>
+              <a:rPr lang="fr-FR" dirty="0"/>
+              <a:t>Revoir le rapport au voyage et prouver que le slow </a:t>
+            </a:r>
+            <a:r>
+              <a:rPr lang="fr-FR" dirty="0" err="1"/>
+              <a:t>travel</a:t>
+            </a:r>
+            <a:r>
+              <a:rPr lang="fr-FR" dirty="0"/>
+              <a:t> est une alternative accessible à tous</a:t>
+            </a:r>
+          </a:p>
+          <a:p>
+            <a:pPr marL="914400" lvl="1" indent="-457200">
+              <a:buFont typeface="+mj-lt"/>
+              <a:buAutoNum type="arabicPeriod"/>
+            </a:pPr>
+            <a:endParaRPr lang="fr-FR" dirty="0"/>
           </a:p>
         </p:txBody>
       </p:sp>
     </p:spTree>
     <p:extLst>
       <p:ext uri="{BB962C8B-B14F-4D97-AF65-F5344CB8AC3E}">
-        <p14:creationId xmlns:p14="http://schemas.microsoft.com/office/powerpoint/2010/main" val="2052891823"/>
+        <p14:creationId xmlns:p14="http://schemas.microsoft.com/office/powerpoint/2010/main" val="3743802578"/>
       </p:ext>
     </p:extLst>
   </p:cSld>
@@ -3660,7 +3765,7 @@
           <p:cNvPr id="2" name="Titre 1">
             <a:extLst>
               <a:ext uri="{FF2B5EF4-FFF2-40B4-BE49-F238E27FC236}">
-                <a16:creationId xmlns:a16="http://schemas.microsoft.com/office/drawing/2014/main" id="{FB5221EB-8E42-DFFB-8FBB-4FE5B825B09F}"/>
+                <a16:creationId xmlns:a16="http://schemas.microsoft.com/office/drawing/2014/main" id="{22ED492B-CCF7-A34C-3BA3-C35ADB911C6E}"/>
               </a:ext>
             </a:extLst>
           </p:cNvPr>
@@ -3677,14 +3782,9 @@
           <a:lstStyle/>
           <a:p>
             <a:r>
-              <a:rPr lang="en-GB" dirty="0"/>
-              <a:t>Analyse </a:t>
-            </a:r>
-            <a:r>
-              <a:rPr lang="en-GB" dirty="0" err="1"/>
-              <a:t>concurrentielle</a:t>
-            </a:r>
-            <a:endParaRPr lang="en-GB" dirty="0"/>
+              <a:rPr lang="fr-FR" dirty="0"/>
+              <a:t>Caractéristiques primaires</a:t>
+            </a:r>
           </a:p>
         </p:txBody>
       </p:sp>
@@ -3693,7 +3793,7 @@
           <p:cNvPr id="3" name="Espace réservé du contenu 2">
             <a:extLst>
               <a:ext uri="{FF2B5EF4-FFF2-40B4-BE49-F238E27FC236}">
-                <a16:creationId xmlns:a16="http://schemas.microsoft.com/office/drawing/2014/main" id="{9C308134-D8E3-4C99-1F2F-612E253AAA4F}"/>
+                <a16:creationId xmlns:a16="http://schemas.microsoft.com/office/drawing/2014/main" id="{46A23C24-BB72-F9AC-476B-19906529B176}"/>
               </a:ext>
             </a:extLst>
           </p:cNvPr>
@@ -3710,105 +3810,81 @@
           <a:lstStyle/>
           <a:p>
             <a:r>
-              <a:rPr lang="en-GB" dirty="0"/>
-              <a:t>Analyse </a:t>
-            </a:r>
-            <a:r>
-              <a:rPr lang="en-GB" dirty="0" err="1"/>
-              <a:t>d’une</a:t>
-            </a:r>
-            <a:r>
-              <a:rPr lang="en-GB" dirty="0"/>
-              <a:t> </a:t>
-            </a:r>
-            <a:r>
-              <a:rPr lang="en-GB" dirty="0" err="1"/>
-              <a:t>trentaine</a:t>
-            </a:r>
-            <a:r>
-              <a:rPr lang="en-GB" dirty="0"/>
-              <a:t> de site </a:t>
-            </a:r>
-            <a:r>
-              <a:rPr lang="en-GB" dirty="0" err="1"/>
-              <a:t>d’aide</a:t>
-            </a:r>
-            <a:r>
-              <a:rPr lang="en-GB" dirty="0"/>
-              <a:t> </a:t>
-            </a:r>
-            <a:r>
-              <a:rPr lang="en-GB" dirty="0" err="1"/>
-              <a:t>à</a:t>
-            </a:r>
-            <a:r>
-              <a:rPr lang="en-GB" dirty="0"/>
-              <a:t> la planification de voyage integrant </a:t>
-            </a:r>
-            <a:r>
-              <a:rPr lang="en-GB" dirty="0" err="1"/>
-              <a:t>l’IA</a:t>
-            </a:r>
-            <a:endParaRPr lang="en-GB" dirty="0"/>
-          </a:p>
-          <a:p>
-            <a:r>
-              <a:rPr lang="en-GB" dirty="0"/>
-              <a:t>2 formats </a:t>
-            </a:r>
-            <a:r>
-              <a:rPr lang="en-GB" dirty="0" err="1"/>
-              <a:t>principaux</a:t>
-            </a:r>
-            <a:r>
-              <a:rPr lang="en-GB" dirty="0"/>
-              <a:t> : le chatbot et le questionnaire</a:t>
-            </a:r>
-          </a:p>
-          <a:p>
-            <a:r>
-              <a:rPr lang="en-GB" dirty="0"/>
-              <a:t>La </a:t>
-            </a:r>
-            <a:r>
-              <a:rPr lang="en-GB" dirty="0" err="1"/>
-              <a:t>plupart</a:t>
-            </a:r>
-            <a:r>
-              <a:rPr lang="en-GB" dirty="0"/>
-              <a:t> du temps, pas </a:t>
-            </a:r>
-            <a:r>
-              <a:rPr lang="en-GB" dirty="0" err="1"/>
-              <a:t>d’itinéraire</a:t>
-            </a:r>
-            <a:r>
-              <a:rPr lang="en-GB" dirty="0"/>
-              <a:t>, </a:t>
-            </a:r>
-            <a:r>
-              <a:rPr lang="en-GB" dirty="0" err="1"/>
-              <a:t>seulement</a:t>
-            </a:r>
-            <a:r>
-              <a:rPr lang="en-GB" dirty="0"/>
-              <a:t> </a:t>
-            </a:r>
-            <a:r>
-              <a:rPr lang="en-GB" dirty="0" err="1"/>
-              <a:t>une</a:t>
-            </a:r>
-            <a:r>
-              <a:rPr lang="en-GB" dirty="0"/>
-              <a:t> destination</a:t>
-            </a:r>
+              <a:rPr lang="fr-FR" dirty="0"/>
+              <a:t>Création grâce à l’IA de 2 itinéraires répondant aux critères suivants :</a:t>
+            </a:r>
+          </a:p>
+          <a:p>
+            <a:pPr lvl="1"/>
+            <a:r>
+              <a:rPr lang="fr-FR" dirty="0"/>
+              <a:t>Ville de départ</a:t>
+            </a:r>
+          </a:p>
+          <a:p>
+            <a:pPr lvl="1"/>
+            <a:r>
+              <a:rPr lang="fr-FR" dirty="0"/>
+              <a:t>Destination</a:t>
+            </a:r>
+          </a:p>
+          <a:p>
+            <a:pPr lvl="1"/>
+            <a:r>
+              <a:rPr lang="fr-FR" dirty="0"/>
+              <a:t>Durée</a:t>
+            </a:r>
+          </a:p>
+          <a:p>
+            <a:pPr lvl="1"/>
+            <a:r>
+              <a:rPr lang="fr-FR" dirty="0"/>
+              <a:t>Mode de transport</a:t>
+            </a:r>
+          </a:p>
+          <a:p>
+            <a:pPr lvl="1"/>
+            <a:r>
+              <a:rPr lang="fr-FR" dirty="0"/>
+              <a:t>Préférences</a:t>
+            </a:r>
+          </a:p>
+          <a:p>
+            <a:r>
+              <a:rPr lang="fr-FR" dirty="0"/>
+              <a:t>Création d’une carte pour visualiser l’itinéraire</a:t>
+            </a:r>
+          </a:p>
+          <a:p>
+            <a:r>
+              <a:rPr lang="fr-FR" dirty="0"/>
+              <a:t>Suggestion d’activités éthiques / éco-responsables :</a:t>
+            </a:r>
+          </a:p>
+          <a:p>
+            <a:pPr lvl="1"/>
+            <a:r>
+              <a:rPr lang="fr-FR" dirty="0"/>
+              <a:t>À voir</a:t>
+            </a:r>
+          </a:p>
+          <a:p>
+            <a:pPr lvl="1"/>
+            <a:r>
+              <a:rPr lang="fr-FR" dirty="0"/>
+              <a:t>À faire</a:t>
+            </a:r>
+          </a:p>
+          <a:p>
+            <a:pPr lvl="1"/>
+            <a:endParaRPr lang="fr-FR" dirty="0"/>
           </a:p>
         </p:txBody>
       </p:sp>
     </p:spTree>
     <p:extLst>
       <p:ext uri="{BB962C8B-B14F-4D97-AF65-F5344CB8AC3E}">
-        <p14:creationId xmlns:p14="http://schemas.microsoft.com/office/powerpoint/2010/main" val="4171202767"/>
+        <p14:creationId xmlns:p14="http://schemas.microsoft.com/office/powerpoint/2010/main" val="1295619657"/>
       </p:ext>
     </p:extLst>
   </p:cSld>
@@ -3840,7 +3916,7 @@
           <p:cNvPr id="2" name="Titre 1">
             <a:extLst>
               <a:ext uri="{FF2B5EF4-FFF2-40B4-BE49-F238E27FC236}">
-                <a16:creationId xmlns:a16="http://schemas.microsoft.com/office/drawing/2014/main" id="{9FB2093C-10DD-FCBC-F273-FF0ADA0A00A7}"/>
+                <a16:creationId xmlns:a16="http://schemas.microsoft.com/office/drawing/2014/main" id="{F4DBDE23-3D1E-952A-6EF3-83FC17DD6F15}"/>
               </a:ext>
             </a:extLst>
           </p:cNvPr>
@@ -3857,18 +3933,9 @@
           <a:lstStyle/>
           <a:p>
             <a:r>
-              <a:rPr lang="en-GB" dirty="0" err="1"/>
-              <a:t>Concurrents</a:t>
-            </a:r>
-            <a:r>
-              <a:rPr lang="en-GB" dirty="0"/>
-              <a:t> </a:t>
-            </a:r>
-            <a:r>
-              <a:rPr lang="en-GB" dirty="0" err="1"/>
-              <a:t>pertinents</a:t>
-            </a:r>
-            <a:endParaRPr lang="en-GB" dirty="0"/>
+              <a:rPr lang="fr-FR" dirty="0"/>
+              <a:t>Caractéristiques secondaires</a:t>
+            </a:r>
           </a:p>
         </p:txBody>
       </p:sp>
@@ -3877,7 +3944,7 @@
           <p:cNvPr id="3" name="Espace réservé du contenu 2">
             <a:extLst>
               <a:ext uri="{FF2B5EF4-FFF2-40B4-BE49-F238E27FC236}">
-                <a16:creationId xmlns:a16="http://schemas.microsoft.com/office/drawing/2014/main" id="{EF7EC2ED-59A3-49DD-2A19-7668CF8AC006}"/>
+                <a16:creationId xmlns:a16="http://schemas.microsoft.com/office/drawing/2014/main" id="{165EA64A-E70B-FEFA-0FFA-7035C5058A06}"/>
               </a:ext>
             </a:extLst>
           </p:cNvPr>
@@ -3894,292 +3961,14 @@
           <a:lstStyle/>
           <a:p>
             <a:r>
-              <a:rPr lang="en-GB" dirty="0" err="1"/>
-              <a:t>ByWay</a:t>
-            </a:r>
-            <a:r>
-              <a:rPr lang="en-GB" dirty="0"/>
-              <a:t> : questionnaire, </a:t>
-            </a:r>
-            <a:r>
-              <a:rPr lang="en-GB" dirty="0" err="1"/>
-              <a:t>peu</a:t>
-            </a:r>
-            <a:r>
-              <a:rPr lang="en-GB" dirty="0"/>
-              <a:t> de </a:t>
-            </a:r>
-            <a:r>
-              <a:rPr lang="en-GB" dirty="0" err="1"/>
-              <a:t>villes</a:t>
-            </a:r>
-            <a:r>
-              <a:rPr lang="en-GB" dirty="0"/>
-              <a:t> de depart, </a:t>
-            </a:r>
-            <a:r>
-              <a:rPr lang="en-GB" dirty="0" err="1"/>
-              <a:t>fonctionne</a:t>
-            </a:r>
-            <a:r>
-              <a:rPr lang="en-GB" dirty="0"/>
-              <a:t> surtout bien au UK, </a:t>
-            </a:r>
-            <a:r>
-              <a:rPr lang="en-GB" dirty="0" err="1"/>
-              <a:t>n’utilise</a:t>
-            </a:r>
-            <a:r>
-              <a:rPr lang="en-GB" dirty="0"/>
-              <a:t> pas </a:t>
-            </a:r>
-            <a:r>
-              <a:rPr lang="en-GB" dirty="0" err="1"/>
-              <a:t>l’IA</a:t>
-            </a:r>
-            <a:r>
-              <a:rPr lang="en-GB" dirty="0"/>
-              <a:t>, </a:t>
-            </a:r>
-            <a:r>
-              <a:rPr lang="en-GB" dirty="0" err="1"/>
-              <a:t>donc</a:t>
-            </a:r>
-            <a:r>
-              <a:rPr lang="en-GB" dirty="0"/>
-              <a:t> pas de mise </a:t>
-            </a:r>
-            <a:r>
-              <a:rPr lang="en-GB" dirty="0" err="1"/>
-              <a:t>à</a:t>
-            </a:r>
-            <a:r>
-              <a:rPr lang="en-GB" dirty="0"/>
-              <a:t> jour des </a:t>
-            </a:r>
-            <a:r>
-              <a:rPr lang="en-GB" dirty="0" err="1"/>
-              <a:t>données</a:t>
-            </a:r>
-            <a:endParaRPr lang="en-GB" dirty="0"/>
-          </a:p>
-          <a:p>
-            <a:r>
-              <a:rPr lang="en-GB" dirty="0" err="1"/>
-              <a:t>Novae.Travel</a:t>
-            </a:r>
-            <a:r>
-              <a:rPr lang="en-GB" dirty="0"/>
-              <a:t> : </a:t>
-            </a:r>
-            <a:r>
-              <a:rPr lang="en-GB" dirty="0">
-                <a:solidFill>
-                  <a:srgbClr val="FF0000"/>
-                </a:solidFill>
-              </a:rPr>
-              <a:t>chatbot</a:t>
-            </a:r>
-            <a:r>
-              <a:rPr lang="en-GB" dirty="0"/>
-              <a:t>, </a:t>
-            </a:r>
-            <a:r>
-              <a:rPr lang="en-GB" dirty="0" err="1"/>
-              <a:t>parcours</a:t>
-            </a:r>
-            <a:r>
-              <a:rPr lang="en-GB" dirty="0"/>
-              <a:t> non </a:t>
-            </a:r>
-            <a:r>
-              <a:rPr lang="en-GB" dirty="0" err="1"/>
-              <a:t>logique</a:t>
-            </a:r>
-            <a:r>
-              <a:rPr lang="en-GB" dirty="0"/>
-              <a:t>, </a:t>
-            </a:r>
-            <a:r>
-              <a:rPr lang="en-GB" dirty="0" err="1"/>
-              <a:t>uniquement</a:t>
-            </a:r>
-            <a:r>
-              <a:rPr lang="en-GB" dirty="0"/>
-              <a:t> au depart de </a:t>
-            </a:r>
-            <a:r>
-              <a:rPr lang="en-GB" dirty="0" err="1"/>
-              <a:t>Londres</a:t>
-            </a:r>
-            <a:r>
-              <a:rPr lang="en-GB" dirty="0"/>
-              <a:t>, </a:t>
-            </a:r>
-            <a:r>
-              <a:rPr lang="en-GB" dirty="0" err="1"/>
-              <a:t>peu</a:t>
-            </a:r>
-            <a:r>
-              <a:rPr lang="en-GB" dirty="0"/>
-              <a:t> </a:t>
-            </a:r>
-            <a:r>
-              <a:rPr lang="en-GB" dirty="0" err="1"/>
-              <a:t>d’info</a:t>
-            </a:r>
-            <a:r>
-              <a:rPr lang="en-GB" dirty="0"/>
-              <a:t> </a:t>
-            </a:r>
-            <a:r>
-              <a:rPr lang="en-GB" dirty="0" err="1"/>
-              <a:t>dispo</a:t>
-            </a:r>
-            <a:r>
-              <a:rPr lang="en-GB" dirty="0"/>
-              <a:t>, il faut savoir faire </a:t>
-            </a:r>
-            <a:r>
-              <a:rPr lang="en-GB" dirty="0" err="1"/>
-              <a:t>une</a:t>
-            </a:r>
-            <a:r>
-              <a:rPr lang="en-GB" dirty="0"/>
-              <a:t> bonne </a:t>
-            </a:r>
-            <a:r>
-              <a:rPr lang="en-GB" dirty="0" err="1"/>
-              <a:t>requête</a:t>
-            </a:r>
-            <a:r>
-              <a:rPr lang="en-GB" dirty="0"/>
-              <a:t> </a:t>
-            </a:r>
-            <a:r>
-              <a:rPr lang="en-GB" dirty="0" err="1"/>
-              <a:t>à</a:t>
-            </a:r>
-            <a:r>
-              <a:rPr lang="en-GB" dirty="0"/>
-              <a:t> </a:t>
-            </a:r>
-            <a:r>
-              <a:rPr lang="en-GB" dirty="0" err="1"/>
-              <a:t>l’IA</a:t>
-            </a:r>
-            <a:r>
-              <a:rPr lang="en-GB" dirty="0"/>
-              <a:t>.</a:t>
-            </a:r>
-          </a:p>
-          <a:p>
-            <a:r>
-              <a:rPr lang="en-GB" dirty="0"/>
-              <a:t>Curioso : pas de questionnaire (pays + </a:t>
-            </a:r>
-            <a:r>
-              <a:rPr lang="en-GB" dirty="0" err="1"/>
-              <a:t>ville</a:t>
-            </a:r>
-            <a:r>
-              <a:rPr lang="en-GB" dirty="0"/>
-              <a:t> </a:t>
-            </a:r>
-            <a:r>
-              <a:rPr lang="en-GB" dirty="0" err="1"/>
-              <a:t>uniquement</a:t>
-            </a:r>
-            <a:r>
-              <a:rPr lang="en-GB" dirty="0"/>
-              <a:t>), propose 4 </a:t>
-            </a:r>
-            <a:r>
-              <a:rPr lang="en-GB" dirty="0" err="1"/>
-              <a:t>roadtrips</a:t>
-            </a:r>
-            <a:r>
-              <a:rPr lang="en-GB" dirty="0"/>
-              <a:t>, pas </a:t>
-            </a:r>
-            <a:r>
-              <a:rPr lang="en-GB" dirty="0" err="1"/>
-              <a:t>forcément</a:t>
-            </a:r>
-            <a:r>
-              <a:rPr lang="en-GB" dirty="0"/>
-              <a:t> </a:t>
-            </a:r>
-            <a:r>
-              <a:rPr lang="en-GB" dirty="0" err="1"/>
-              <a:t>écologique</a:t>
-            </a:r>
-            <a:endParaRPr lang="en-GB" dirty="0"/>
-          </a:p>
-          <a:p>
-            <a:r>
-              <a:rPr lang="en-GB" dirty="0" err="1"/>
-              <a:t>Roamaround</a:t>
-            </a:r>
-            <a:r>
-              <a:rPr lang="en-GB" dirty="0"/>
-              <a:t> : pas de map, pas </a:t>
-            </a:r>
-            <a:r>
-              <a:rPr lang="en-GB" dirty="0" err="1"/>
-              <a:t>l’aspect</a:t>
-            </a:r>
-            <a:r>
-              <a:rPr lang="en-GB" dirty="0"/>
-              <a:t> </a:t>
-            </a:r>
-            <a:r>
-              <a:rPr lang="en-GB" dirty="0" err="1"/>
-              <a:t>écologique</a:t>
-            </a:r>
-            <a:r>
-              <a:rPr lang="en-GB" dirty="0"/>
-              <a:t>, </a:t>
-            </a:r>
-            <a:r>
-              <a:rPr lang="en-GB" dirty="0" err="1"/>
-              <a:t>uniquement</a:t>
-            </a:r>
-            <a:r>
-              <a:rPr lang="en-GB" dirty="0"/>
-              <a:t> 5 “</a:t>
-            </a:r>
-            <a:r>
-              <a:rPr lang="en-GB" dirty="0" err="1"/>
-              <a:t>contraintes</a:t>
-            </a:r>
-            <a:r>
-              <a:rPr lang="en-GB" dirty="0"/>
-              <a:t>” </a:t>
-            </a:r>
-            <a:r>
-              <a:rPr lang="en-GB" dirty="0" err="1"/>
-              <a:t>sinon</a:t>
-            </a:r>
-            <a:r>
-              <a:rPr lang="en-GB" dirty="0"/>
-              <a:t> </a:t>
-            </a:r>
-            <a:r>
-              <a:rPr lang="en-GB" dirty="0" err="1"/>
-              <a:t>trajhet</a:t>
-            </a:r>
-            <a:r>
-              <a:rPr lang="en-GB" dirty="0"/>
-              <a:t> direct </a:t>
-            </a:r>
-            <a:r>
-              <a:rPr lang="en-GB" dirty="0" err="1"/>
-              <a:t>vers</a:t>
-            </a:r>
-            <a:r>
-              <a:rPr lang="en-GB" dirty="0"/>
-              <a:t> la destination</a:t>
+              <a:rPr lang="fr-FR" dirty="0"/>
+              <a:t>Calcul de l’impact carbone de l’itinéraire et des activités + comparaison avec un itinéraire classique</a:t>
+            </a:r>
+          </a:p>
+          <a:p>
+            <a:r>
+              <a:rPr lang="fr-FR" dirty="0"/>
+              <a:t>Suggestion</a:t>
             </a:r>
           </a:p>
         </p:txBody>
@@ -4187,7 +3976,7 @@
     </p:spTree>
     <p:extLst>
       <p:ext uri="{BB962C8B-B14F-4D97-AF65-F5344CB8AC3E}">
-        <p14:creationId xmlns:p14="http://schemas.microsoft.com/office/powerpoint/2010/main" val="2051433698"/>
+        <p14:creationId xmlns:p14="http://schemas.microsoft.com/office/powerpoint/2010/main" val="495701463"/>
       </p:ext>
     </p:extLst>
   </p:cSld>
@@ -4219,7 +4008,7 @@
           <p:cNvPr id="2" name="Titre 1">
             <a:extLst>
               <a:ext uri="{FF2B5EF4-FFF2-40B4-BE49-F238E27FC236}">
-                <a16:creationId xmlns:a16="http://schemas.microsoft.com/office/drawing/2014/main" id="{22B15826-69EF-1A46-AA24-5567EC266FBF}"/>
+                <a16:creationId xmlns:a16="http://schemas.microsoft.com/office/drawing/2014/main" id="{C6924090-EFD5-0FD0-7683-2B56E0B1E12B}"/>
               </a:ext>
             </a:extLst>
           </p:cNvPr>
@@ -4235,7 +4024,10 @@
           <a:bodyPr/>
           <a:lstStyle/>
           <a:p>
-            <a:endParaRPr lang="en-GB" dirty="0"/>
+            <a:r>
+              <a:rPr lang="fr-FR" dirty="0"/>
+              <a:t>II. Analyse des besoins</a:t>
+            </a:r>
           </a:p>
         </p:txBody>
       </p:sp>
@@ -4244,7 +4036,7 @@
           <p:cNvPr id="3" name="Espace réservé du contenu 2">
             <a:extLst>
               <a:ext uri="{FF2B5EF4-FFF2-40B4-BE49-F238E27FC236}">
-                <a16:creationId xmlns:a16="http://schemas.microsoft.com/office/drawing/2014/main" id="{C33365C9-48DC-2DB9-B982-9D5F72B0C14A}"/>
+                <a16:creationId xmlns:a16="http://schemas.microsoft.com/office/drawing/2014/main" id="{92AB529C-2F84-2C3D-6B19-2CA49FB365FB}"/>
               </a:ext>
             </a:extLst>
           </p:cNvPr>
@@ -4260,84 +4052,14 @@
           <a:bodyPr/>
           <a:lstStyle/>
           <a:p>
-            <a:r>
-              <a:rPr lang="en-GB" dirty="0"/>
-              <a:t>Pas </a:t>
-            </a:r>
-            <a:r>
-              <a:rPr lang="en-GB" dirty="0" err="1"/>
-              <a:t>d’intérêt</a:t>
-            </a:r>
-            <a:r>
-              <a:rPr lang="en-GB" dirty="0"/>
-              <a:t> de faire un chatbot : </a:t>
-            </a:r>
-            <a:r>
-              <a:rPr lang="en-GB" dirty="0" err="1"/>
-              <a:t>autant</a:t>
-            </a:r>
-            <a:r>
-              <a:rPr lang="en-GB" dirty="0"/>
-              <a:t> utiliser </a:t>
-            </a:r>
-            <a:r>
-              <a:rPr lang="en-GB" dirty="0" err="1"/>
-              <a:t>une</a:t>
-            </a:r>
-            <a:r>
-              <a:rPr lang="en-GB" dirty="0"/>
-              <a:t> IA </a:t>
-            </a:r>
-            <a:r>
-              <a:rPr lang="en-GB" dirty="0" err="1"/>
-              <a:t>existante</a:t>
-            </a:r>
-            <a:endParaRPr lang="en-GB" dirty="0"/>
-          </a:p>
-          <a:p>
-            <a:r>
-              <a:rPr lang="en-GB" dirty="0"/>
-              <a:t>Très </a:t>
-            </a:r>
-            <a:r>
-              <a:rPr lang="en-GB" dirty="0" err="1"/>
-              <a:t>peu</a:t>
-            </a:r>
-            <a:r>
-              <a:rPr lang="en-GB" dirty="0"/>
-              <a:t> de solutions </a:t>
-            </a:r>
-            <a:r>
-              <a:rPr lang="en-GB" dirty="0" err="1"/>
-              <a:t>intègrent</a:t>
-            </a:r>
-            <a:r>
-              <a:rPr lang="en-GB" dirty="0"/>
-              <a:t> </a:t>
-            </a:r>
-            <a:r>
-              <a:rPr lang="en-GB" dirty="0" err="1"/>
-              <a:t>l’impact</a:t>
-            </a:r>
-            <a:r>
-              <a:rPr lang="en-GB" dirty="0"/>
-              <a:t> </a:t>
-            </a:r>
-            <a:r>
-              <a:rPr lang="en-GB" dirty="0" err="1"/>
-              <a:t>écologique</a:t>
-            </a:r>
-            <a:r>
-              <a:rPr lang="en-GB" dirty="0"/>
-              <a:t> du voyage</a:t>
-            </a:r>
+            <a:endParaRPr lang="fr-FR" dirty="0"/>
           </a:p>
         </p:txBody>
       </p:sp>
     </p:spTree>
     <p:extLst>
       <p:ext uri="{BB962C8B-B14F-4D97-AF65-F5344CB8AC3E}">
-        <p14:creationId xmlns:p14="http://schemas.microsoft.com/office/powerpoint/2010/main" val="2206504477"/>
+        <p14:creationId xmlns:p14="http://schemas.microsoft.com/office/powerpoint/2010/main" val="2052891823"/>
       </p:ext>
     </p:extLst>
   </p:cSld>
@@ -4369,7 +4091,7 @@
           <p:cNvPr id="2" name="Titre 1">
             <a:extLst>
               <a:ext uri="{FF2B5EF4-FFF2-40B4-BE49-F238E27FC236}">
-                <a16:creationId xmlns:a16="http://schemas.microsoft.com/office/drawing/2014/main" id="{04E958C5-5F90-C4DE-66E4-BAF0DA0BF3CE}"/>
+                <a16:creationId xmlns:a16="http://schemas.microsoft.com/office/drawing/2014/main" id="{FB5221EB-8E42-DFFB-8FBB-4FE5B825B09F}"/>
               </a:ext>
             </a:extLst>
           </p:cNvPr>
@@ -4386,8 +4108,8 @@
           <a:lstStyle/>
           <a:p>
             <a:r>
-              <a:rPr lang="en-GB" dirty="0"/>
-              <a:t>Analyse PESTEL</a:t>
+              <a:rPr lang="fr-FR" dirty="0"/>
+              <a:t>III. Analyse concurrentielle</a:t>
             </a:r>
           </a:p>
         </p:txBody>
@@ -4397,7 +4119,7 @@
           <p:cNvPr id="3" name="Espace réservé du contenu 2">
             <a:extLst>
               <a:ext uri="{FF2B5EF4-FFF2-40B4-BE49-F238E27FC236}">
-                <a16:creationId xmlns:a16="http://schemas.microsoft.com/office/drawing/2014/main" id="{2F309955-A141-DFFA-27E1-85015CCAFA8F}"/>
+                <a16:creationId xmlns:a16="http://schemas.microsoft.com/office/drawing/2014/main" id="{9C308134-D8E3-4C99-1F2F-612E253AAA4F}"/>
               </a:ext>
             </a:extLst>
           </p:cNvPr>
@@ -4413,14 +4135,37 @@
           <a:bodyPr/>
           <a:lstStyle/>
           <a:p>
-            <a:endParaRPr lang="en-GB"/>
+            <a:r>
+              <a:rPr lang="fr-FR" dirty="0"/>
+              <a:t>Analyse d’une trentaine de site d’aide à la planification de voyage intégrant l’IA</a:t>
+            </a:r>
+          </a:p>
+          <a:p>
+            <a:r>
+              <a:rPr lang="fr-FR" dirty="0"/>
+              <a:t>2 formats principaux : le </a:t>
+            </a:r>
+            <a:r>
+              <a:rPr lang="fr-FR" dirty="0" err="1"/>
+              <a:t>chatbot</a:t>
+            </a:r>
+            <a:r>
+              <a:rPr lang="fr-FR" dirty="0"/>
+              <a:t> et le questionnaire</a:t>
+            </a:r>
+          </a:p>
+          <a:p>
+            <a:r>
+              <a:rPr lang="fr-FR" dirty="0"/>
+              <a:t>La plupart du temps, pas d’itinéraire, seulement une destination</a:t>
+            </a:r>
           </a:p>
         </p:txBody>
       </p:sp>
     </p:spTree>
     <p:extLst>
       <p:ext uri="{BB962C8B-B14F-4D97-AF65-F5344CB8AC3E}">
-        <p14:creationId xmlns:p14="http://schemas.microsoft.com/office/powerpoint/2010/main" val="2926385413"/>
+        <p14:creationId xmlns:p14="http://schemas.microsoft.com/office/powerpoint/2010/main" val="4171202767"/>
       </p:ext>
     </p:extLst>
   </p:cSld>
@@ -4452,7 +4197,7 @@
           <p:cNvPr id="2" name="Titre 1">
             <a:extLst>
               <a:ext uri="{FF2B5EF4-FFF2-40B4-BE49-F238E27FC236}">
-                <a16:creationId xmlns:a16="http://schemas.microsoft.com/office/drawing/2014/main" id="{D7BFB7CD-9CC0-1F24-7318-72C064958791}"/>
+                <a16:creationId xmlns:a16="http://schemas.microsoft.com/office/drawing/2014/main" id="{9FB2093C-10DD-FCBC-F273-FF0ADA0A00A7}"/>
               </a:ext>
             </a:extLst>
           </p:cNvPr>
@@ -4469,9 +4214,18 @@
           <a:lstStyle/>
           <a:p>
             <a:r>
+              <a:rPr lang="en-GB" dirty="0" err="1"/>
+              <a:t>Concurrents</a:t>
+            </a:r>
+            <a:r>
               <a:rPr lang="en-GB" dirty="0"/>
-              <a:t>Analyse SWOT</a:t>
-            </a:r>
+              <a:t> </a:t>
+            </a:r>
+            <a:r>
+              <a:rPr lang="en-GB" dirty="0" err="1"/>
+              <a:t>pertinents</a:t>
+            </a:r>
+            <a:endParaRPr lang="en-GB" dirty="0"/>
           </a:p>
         </p:txBody>
       </p:sp>
@@ -4480,7 +4234,7 @@
           <p:cNvPr id="3" name="Espace réservé du contenu 2">
             <a:extLst>
               <a:ext uri="{FF2B5EF4-FFF2-40B4-BE49-F238E27FC236}">
-                <a16:creationId xmlns:a16="http://schemas.microsoft.com/office/drawing/2014/main" id="{F2A7EF2D-6AC0-B65E-1B11-3CD3FD672C3D}"/>
+                <a16:creationId xmlns:a16="http://schemas.microsoft.com/office/drawing/2014/main" id="{EF7EC2ED-59A3-49DD-2A19-7668CF8AC006}"/>
               </a:ext>
             </a:extLst>
           </p:cNvPr>
@@ -4496,14 +4250,103 @@
           <a:bodyPr/>
           <a:lstStyle/>
           <a:p>
-            <a:endParaRPr lang="en-GB"/>
+            <a:r>
+              <a:rPr lang="fr-FR" dirty="0" err="1"/>
+              <a:t>ByWay</a:t>
+            </a:r>
+            <a:r>
+              <a:rPr lang="fr-FR" dirty="0"/>
+              <a:t> : questionnaire, peu de villes de </a:t>
+            </a:r>
+            <a:r>
+              <a:rPr lang="fr-FR" dirty="0" err="1"/>
+              <a:t>depart</a:t>
+            </a:r>
+            <a:r>
+              <a:rPr lang="fr-FR" dirty="0"/>
+              <a:t>, fonctionne surtout bien au UK, n’utilise pas l’IA, donc pas de mise à jour des données</a:t>
+            </a:r>
+          </a:p>
+          <a:p>
+            <a:r>
+              <a:rPr lang="fr-FR" dirty="0" err="1"/>
+              <a:t>Novae.Travel</a:t>
+            </a:r>
+            <a:r>
+              <a:rPr lang="fr-FR" dirty="0"/>
+              <a:t> : </a:t>
+            </a:r>
+            <a:r>
+              <a:rPr lang="fr-FR" dirty="0" err="1">
+                <a:solidFill>
+                  <a:srgbClr val="FF0000"/>
+                </a:solidFill>
+              </a:rPr>
+              <a:t>chatbot</a:t>
+            </a:r>
+            <a:r>
+              <a:rPr lang="fr-FR" dirty="0"/>
+              <a:t>, parcours non logique, uniquement au </a:t>
+            </a:r>
+            <a:r>
+              <a:rPr lang="fr-FR" dirty="0" err="1"/>
+              <a:t>depart</a:t>
+            </a:r>
+            <a:r>
+              <a:rPr lang="fr-FR" dirty="0"/>
+              <a:t> de Londres, peu d’info dispo, il faut savoir faire une bonne requête à l’IA.</a:t>
+            </a:r>
+          </a:p>
+          <a:p>
+            <a:r>
+              <a:rPr lang="fr-FR" dirty="0" err="1"/>
+              <a:t>Curioso</a:t>
+            </a:r>
+            <a:r>
+              <a:rPr lang="fr-FR" dirty="0"/>
+              <a:t> : pas de questionnaire (pays + ville uniquement), propose 4 </a:t>
+            </a:r>
+            <a:r>
+              <a:rPr lang="fr-FR" dirty="0" err="1"/>
+              <a:t>roadtrips</a:t>
+            </a:r>
+            <a:r>
+              <a:rPr lang="fr-FR" dirty="0"/>
+              <a:t>, pas forcément écologique</a:t>
+            </a:r>
+          </a:p>
+          <a:p>
+            <a:r>
+              <a:rPr lang="fr-FR" dirty="0" err="1"/>
+              <a:t>Roamaround</a:t>
+            </a:r>
+            <a:r>
+              <a:rPr lang="fr-FR" dirty="0"/>
+              <a:t> : pas de </a:t>
+            </a:r>
+            <a:r>
+              <a:rPr lang="fr-FR" dirty="0" err="1"/>
+              <a:t>map</a:t>
+            </a:r>
+            <a:r>
+              <a:rPr lang="fr-FR" dirty="0"/>
+              <a:t>, pas l’aspect écologique, uniquement 5 “contraintes” sinon </a:t>
+            </a:r>
+            <a:r>
+              <a:rPr lang="fr-FR" dirty="0" err="1"/>
+              <a:t>trajhet</a:t>
+            </a:r>
+            <a:r>
+              <a:rPr lang="fr-FR" dirty="0"/>
+              <a:t> direct vers la destination</a:t>
+            </a:r>
           </a:p>
         </p:txBody>
       </p:sp>
     </p:spTree>
     <p:extLst>
       <p:ext uri="{BB962C8B-B14F-4D97-AF65-F5344CB8AC3E}">
-        <p14:creationId xmlns:p14="http://schemas.microsoft.com/office/powerpoint/2010/main" val="2682887988"/>
+        <p14:creationId xmlns:p14="http://schemas.microsoft.com/office/powerpoint/2010/main" val="2051433698"/>
       </p:ext>
     </p:extLst>
   </p:cSld>
@@ -4535,7 +4378,7 @@
           <p:cNvPr id="2" name="Titre 1">
             <a:extLst>
               <a:ext uri="{FF2B5EF4-FFF2-40B4-BE49-F238E27FC236}">
-                <a16:creationId xmlns:a16="http://schemas.microsoft.com/office/drawing/2014/main" id="{807B7BC1-2ED1-E610-C704-8F8AA01953F8}"/>
+                <a16:creationId xmlns:a16="http://schemas.microsoft.com/office/drawing/2014/main" id="{22B15826-69EF-1A46-AA24-5567EC266FBF}"/>
               </a:ext>
             </a:extLst>
           </p:cNvPr>
@@ -4551,10 +4394,7 @@
           <a:bodyPr/>
           <a:lstStyle/>
           <a:p>
-            <a:r>
-              <a:rPr lang="en-GB" dirty="0"/>
-              <a:t>Segmentation</a:t>
-            </a:r>
+            <a:endParaRPr lang="en-GB" dirty="0"/>
           </a:p>
         </p:txBody>
       </p:sp>
@@ -4563,7 +4403,7 @@
           <p:cNvPr id="3" name="Espace réservé du contenu 2">
             <a:extLst>
               <a:ext uri="{FF2B5EF4-FFF2-40B4-BE49-F238E27FC236}">
-                <a16:creationId xmlns:a16="http://schemas.microsoft.com/office/drawing/2014/main" id="{96E9D622-FFEB-D3EC-A12B-50721A608322}"/>
+                <a16:creationId xmlns:a16="http://schemas.microsoft.com/office/drawing/2014/main" id="{C33365C9-48DC-2DB9-B982-9D5F72B0C14A}"/>
               </a:ext>
             </a:extLst>
           </p:cNvPr>
@@ -4579,14 +4419,1282 @@
           <a:bodyPr/>
           <a:lstStyle/>
           <a:p>
-            <a:endParaRPr lang="en-GB"/>
+            <a:r>
+              <a:rPr lang="fr-FR" dirty="0"/>
+              <a:t>Pas d’intérêt de faire un </a:t>
+            </a:r>
+            <a:r>
+              <a:rPr lang="fr-FR" dirty="0" err="1"/>
+              <a:t>chatbot</a:t>
+            </a:r>
+            <a:r>
+              <a:rPr lang="fr-FR" dirty="0"/>
+              <a:t> : autant utiliser une IA existante</a:t>
+            </a:r>
+          </a:p>
+          <a:p>
+            <a:r>
+              <a:rPr lang="fr-FR" dirty="0"/>
+              <a:t>Très peu de solutions intègrent l’impact écologique du voyage</a:t>
+            </a:r>
+          </a:p>
+          <a:p>
+            <a:r>
+              <a:rPr lang="fr-FR" dirty="0"/>
+              <a:t>Très peu de solutions sont visuelles, faciles à lire</a:t>
+            </a:r>
           </a:p>
         </p:txBody>
       </p:sp>
     </p:spTree>
     <p:extLst>
       <p:ext uri="{BB962C8B-B14F-4D97-AF65-F5344CB8AC3E}">
-        <p14:creationId xmlns:p14="http://schemas.microsoft.com/office/powerpoint/2010/main" val="4209570013"/>
+        <p14:creationId xmlns:p14="http://schemas.microsoft.com/office/powerpoint/2010/main" val="2206504477"/>
+      </p:ext>
+    </p:extLst>
+  </p:cSld>
+  <p:clrMapOvr>
+    <a:masterClrMapping/>
+  </p:clrMapOvr>
+</p:sld>
+</file>
+
+<file path=ppt/slides/slide9.xml><?xml version="1.0" encoding="utf-8"?>
+<p:sld xmlns:a="http://schemas.openxmlformats.org/drawingml/2006/main" xmlns:r="http://schemas.openxmlformats.org/officeDocument/2006/relationships" xmlns:p="http://schemas.openxmlformats.org/presentationml/2006/main">
+  <p:cSld>
+    <p:spTree>
+      <p:nvGrpSpPr>
+        <p:cNvPr id="1" name=""/>
+        <p:cNvGrpSpPr/>
+        <p:nvPr/>
+      </p:nvGrpSpPr>
+      <p:grpSpPr>
+        <a:xfrm>
+          <a:off x="0" y="0"/>
+          <a:ext cx="0" cy="0"/>
+          <a:chOff x="0" y="0"/>
+          <a:chExt cx="0" cy="0"/>
+        </a:xfrm>
+      </p:grpSpPr>
+      <p:sp>
+        <p:nvSpPr>
+          <p:cNvPr id="2" name="Titre 1">
+            <a:extLst>
+              <a:ext uri="{FF2B5EF4-FFF2-40B4-BE49-F238E27FC236}">
+                <a16:creationId xmlns:a16="http://schemas.microsoft.com/office/drawing/2014/main" id="{04E958C5-5F90-C4DE-66E4-BAF0DA0BF3CE}"/>
+              </a:ext>
+            </a:extLst>
+          </p:cNvPr>
+          <p:cNvSpPr>
+            <a:spLocks noGrp="1"/>
+          </p:cNvSpPr>
+          <p:nvPr>
+            <p:ph type="title"/>
+          </p:nvPr>
+        </p:nvSpPr>
+        <p:spPr/>
+        <p:txBody>
+          <a:bodyPr/>
+          <a:lstStyle/>
+          <a:p>
+            <a:r>
+              <a:rPr lang="en-GB" dirty="0"/>
+              <a:t>IV. Analyse PESTEL</a:t>
+            </a:r>
+          </a:p>
+        </p:txBody>
+      </p:sp>
+      <p:sp>
+        <p:nvSpPr>
+          <p:cNvPr id="3" name="Espace réservé du contenu 2">
+            <a:extLst>
+              <a:ext uri="{FF2B5EF4-FFF2-40B4-BE49-F238E27FC236}">
+                <a16:creationId xmlns:a16="http://schemas.microsoft.com/office/drawing/2014/main" id="{2F309955-A141-DFFA-27E1-85015CCAFA8F}"/>
+              </a:ext>
+            </a:extLst>
+          </p:cNvPr>
+          <p:cNvSpPr>
+            <a:spLocks noGrp="1"/>
+          </p:cNvSpPr>
+          <p:nvPr>
+            <p:ph idx="1"/>
+          </p:nvPr>
+        </p:nvSpPr>
+        <p:spPr>
+          <a:xfrm>
+            <a:off x="838200" y="1825625"/>
+            <a:ext cx="3830444" cy="2222268"/>
+          </a:xfrm>
+        </p:spPr>
+        <p:txBody>
+          <a:bodyPr>
+            <a:normAutofit/>
+          </a:bodyPr>
+          <a:lstStyle/>
+          <a:p>
+            <a:pPr marL="0" indent="0" algn="ctr">
+              <a:buNone/>
+            </a:pPr>
+            <a:r>
+              <a:rPr lang="fr-FR" sz="1600" b="1" dirty="0"/>
+              <a:t>POLITIQUE</a:t>
+            </a:r>
+          </a:p>
+          <a:p>
+            <a:r>
+              <a:rPr lang="fr-FR" sz="1600" dirty="0"/>
+              <a:t>Stabilité politique</a:t>
+            </a:r>
+          </a:p>
+          <a:p>
+            <a:r>
+              <a:rPr lang="fr-FR" sz="1600" dirty="0"/>
+              <a:t>Niveau des subventions</a:t>
+            </a:r>
+          </a:p>
+          <a:p>
+            <a:r>
+              <a:rPr lang="fr-FR" sz="1600" dirty="0"/>
+              <a:t>L’Union Européenne</a:t>
+            </a:r>
+          </a:p>
+          <a:p>
+            <a:r>
+              <a:rPr lang="fr-FR" sz="1600" dirty="0"/>
+              <a:t>Budgets publics</a:t>
+            </a:r>
+          </a:p>
+          <a:p>
+            <a:r>
+              <a:rPr lang="fr-FR" sz="1600" dirty="0"/>
+              <a:t>Croissance de la popularité des partis éco</a:t>
+            </a:r>
+          </a:p>
+        </p:txBody>
+      </p:sp>
+      <p:sp>
+        <p:nvSpPr>
+          <p:cNvPr id="4" name="Espace réservé du contenu 2">
+            <a:extLst>
+              <a:ext uri="{FF2B5EF4-FFF2-40B4-BE49-F238E27FC236}">
+                <a16:creationId xmlns:a16="http://schemas.microsoft.com/office/drawing/2014/main" id="{22D593C9-954E-3FCE-C06E-9CA5213960FD}"/>
+              </a:ext>
+            </a:extLst>
+          </p:cNvPr>
+          <p:cNvSpPr txBox="1">
+            <a:spLocks/>
+          </p:cNvSpPr>
+          <p:nvPr/>
+        </p:nvSpPr>
+        <p:spPr>
+          <a:xfrm>
+            <a:off x="5117483" y="325109"/>
+            <a:ext cx="3558166" cy="1205165"/>
+          </a:xfrm>
+          <a:prstGeom prst="rect">
+            <a:avLst/>
+          </a:prstGeom>
+        </p:spPr>
+        <p:txBody>
+          <a:bodyPr vert="horz" lIns="91440" tIns="45720" rIns="91440" bIns="45720" rtlCol="0">
+            <a:normAutofit/>
+          </a:bodyPr>
+          <a:lstStyle>
+            <a:lvl1pPr marL="228600" indent="-228600" algn="l" defTabSz="914400" rtl="0" eaLnBrk="1" latinLnBrk="0" hangingPunct="1">
+              <a:lnSpc>
+                <a:spcPct val="90000"/>
+              </a:lnSpc>
+              <a:spcBef>
+                <a:spcPts val="1000"/>
+              </a:spcBef>
+              <a:buFont typeface="Arial" panose="020B0604020202020204" pitchFamily="34" charset="0"/>
+              <a:buChar char="•"/>
+              <a:defRPr sz="2800" kern="1200">
+                <a:solidFill>
+                  <a:schemeClr val="tx1"/>
+                </a:solidFill>
+                <a:latin typeface="+mn-lt"/>
+                <a:ea typeface="+mn-ea"/>
+                <a:cs typeface="+mn-cs"/>
+              </a:defRPr>
+            </a:lvl1pPr>
+            <a:lvl2pPr marL="685800" indent="-228600" algn="l" defTabSz="914400" rtl="0" eaLnBrk="1" latinLnBrk="0" hangingPunct="1">
+              <a:lnSpc>
+                <a:spcPct val="90000"/>
+              </a:lnSpc>
+              <a:spcBef>
+                <a:spcPts val="500"/>
+              </a:spcBef>
+              <a:buFont typeface="Arial" panose="020B0604020202020204" pitchFamily="34" charset="0"/>
+              <a:buChar char="•"/>
+              <a:defRPr sz="2400" kern="1200">
+                <a:solidFill>
+                  <a:schemeClr val="tx1"/>
+                </a:solidFill>
+                <a:latin typeface="+mn-lt"/>
+                <a:ea typeface="+mn-ea"/>
+                <a:cs typeface="+mn-cs"/>
+              </a:defRPr>
+            </a:lvl2pPr>
+            <a:lvl3pPr marL="1143000" indent="-228600" algn="l" defTabSz="914400" rtl="0" eaLnBrk="1" latinLnBrk="0" hangingPunct="1">
+              <a:lnSpc>
+                <a:spcPct val="90000"/>
+              </a:lnSpc>
+              <a:spcBef>
+                <a:spcPts val="500"/>
+              </a:spcBef>
+              <a:buFont typeface="Arial" panose="020B0604020202020204" pitchFamily="34" charset="0"/>
+              <a:buChar char="•"/>
+              <a:defRPr sz="2000" kern="1200">
+                <a:solidFill>
+                  <a:schemeClr val="tx1"/>
+                </a:solidFill>
+                <a:latin typeface="+mn-lt"/>
+                <a:ea typeface="+mn-ea"/>
+                <a:cs typeface="+mn-cs"/>
+              </a:defRPr>
+            </a:lvl3pPr>
+            <a:lvl4pPr marL="1600200" indent="-228600" algn="l" defTabSz="914400" rtl="0" eaLnBrk="1" latinLnBrk="0" hangingPunct="1">
+              <a:lnSpc>
+                <a:spcPct val="90000"/>
+              </a:lnSpc>
+              <a:spcBef>
+                <a:spcPts val="500"/>
+              </a:spcBef>
+              <a:buFont typeface="Arial" panose="020B0604020202020204" pitchFamily="34" charset="0"/>
+              <a:buChar char="•"/>
+              <a:defRPr sz="1800" kern="1200">
+                <a:solidFill>
+                  <a:schemeClr val="tx1"/>
+                </a:solidFill>
+                <a:latin typeface="+mn-lt"/>
+                <a:ea typeface="+mn-ea"/>
+                <a:cs typeface="+mn-cs"/>
+              </a:defRPr>
+            </a:lvl4pPr>
+            <a:lvl5pPr marL="2057400" indent="-228600" algn="l" defTabSz="914400" rtl="0" eaLnBrk="1" latinLnBrk="0" hangingPunct="1">
+              <a:lnSpc>
+                <a:spcPct val="90000"/>
+              </a:lnSpc>
+              <a:spcBef>
+                <a:spcPts val="500"/>
+              </a:spcBef>
+              <a:buFont typeface="Arial" panose="020B0604020202020204" pitchFamily="34" charset="0"/>
+              <a:buChar char="•"/>
+              <a:defRPr sz="1800" kern="1200">
+                <a:solidFill>
+                  <a:schemeClr val="tx1"/>
+                </a:solidFill>
+                <a:latin typeface="+mn-lt"/>
+                <a:ea typeface="+mn-ea"/>
+                <a:cs typeface="+mn-cs"/>
+              </a:defRPr>
+            </a:lvl5pPr>
+            <a:lvl6pPr marL="2514600" indent="-228600" algn="l" defTabSz="914400" rtl="0" eaLnBrk="1" latinLnBrk="0" hangingPunct="1">
+              <a:lnSpc>
+                <a:spcPct val="90000"/>
+              </a:lnSpc>
+              <a:spcBef>
+                <a:spcPts val="500"/>
+              </a:spcBef>
+              <a:buFont typeface="Arial" panose="020B0604020202020204" pitchFamily="34" charset="0"/>
+              <a:buChar char="•"/>
+              <a:defRPr sz="1800" kern="1200">
+                <a:solidFill>
+                  <a:schemeClr val="tx1"/>
+                </a:solidFill>
+                <a:latin typeface="+mn-lt"/>
+                <a:ea typeface="+mn-ea"/>
+                <a:cs typeface="+mn-cs"/>
+              </a:defRPr>
+            </a:lvl6pPr>
+            <a:lvl7pPr marL="2971800" indent="-228600" algn="l" defTabSz="914400" rtl="0" eaLnBrk="1" latinLnBrk="0" hangingPunct="1">
+              <a:lnSpc>
+                <a:spcPct val="90000"/>
+              </a:lnSpc>
+              <a:spcBef>
+                <a:spcPts val="500"/>
+              </a:spcBef>
+              <a:buFont typeface="Arial" panose="020B0604020202020204" pitchFamily="34" charset="0"/>
+              <a:buChar char="•"/>
+              <a:defRPr sz="1800" kern="1200">
+                <a:solidFill>
+                  <a:schemeClr val="tx1"/>
+                </a:solidFill>
+                <a:latin typeface="+mn-lt"/>
+                <a:ea typeface="+mn-ea"/>
+                <a:cs typeface="+mn-cs"/>
+              </a:defRPr>
+            </a:lvl7pPr>
+            <a:lvl8pPr marL="3429000" indent="-228600" algn="l" defTabSz="914400" rtl="0" eaLnBrk="1" latinLnBrk="0" hangingPunct="1">
+              <a:lnSpc>
+                <a:spcPct val="90000"/>
+              </a:lnSpc>
+              <a:spcBef>
+                <a:spcPts val="500"/>
+              </a:spcBef>
+              <a:buFont typeface="Arial" panose="020B0604020202020204" pitchFamily="34" charset="0"/>
+              <a:buChar char="•"/>
+              <a:defRPr sz="1800" kern="1200">
+                <a:solidFill>
+                  <a:schemeClr val="tx1"/>
+                </a:solidFill>
+                <a:latin typeface="+mn-lt"/>
+                <a:ea typeface="+mn-ea"/>
+                <a:cs typeface="+mn-cs"/>
+              </a:defRPr>
+            </a:lvl8pPr>
+            <a:lvl9pPr marL="3886200" indent="-228600" algn="l" defTabSz="914400" rtl="0" eaLnBrk="1" latinLnBrk="0" hangingPunct="1">
+              <a:lnSpc>
+                <a:spcPct val="90000"/>
+              </a:lnSpc>
+              <a:spcBef>
+                <a:spcPts val="500"/>
+              </a:spcBef>
+              <a:buFont typeface="Arial" panose="020B0604020202020204" pitchFamily="34" charset="0"/>
+              <a:buChar char="•"/>
+              <a:defRPr sz="1800" kern="1200">
+                <a:solidFill>
+                  <a:schemeClr val="tx1"/>
+                </a:solidFill>
+                <a:latin typeface="+mn-lt"/>
+                <a:ea typeface="+mn-ea"/>
+                <a:cs typeface="+mn-cs"/>
+              </a:defRPr>
+            </a:lvl9pPr>
+          </a:lstStyle>
+          <a:p>
+            <a:pPr marL="0" indent="0" algn="ctr">
+              <a:buFont typeface="Arial" panose="020B0604020202020204" pitchFamily="34" charset="0"/>
+              <a:buNone/>
+            </a:pPr>
+            <a:r>
+              <a:rPr lang="fr-FR" sz="1600" dirty="0"/>
+              <a:t>ECONOMIQUE</a:t>
+            </a:r>
+          </a:p>
+          <a:p>
+            <a:r>
+              <a:rPr lang="fr-FR" sz="1600" dirty="0"/>
+              <a:t>Inflation</a:t>
+            </a:r>
+          </a:p>
+          <a:p>
+            <a:r>
+              <a:rPr lang="fr-FR" sz="1600" dirty="0"/>
+              <a:t>Revenu disponible et pouvoir d’achat</a:t>
+            </a:r>
+          </a:p>
+        </p:txBody>
+      </p:sp>
+      <p:sp>
+        <p:nvSpPr>
+          <p:cNvPr id="5" name="Espace réservé du contenu 2">
+            <a:extLst>
+              <a:ext uri="{FF2B5EF4-FFF2-40B4-BE49-F238E27FC236}">
+                <a16:creationId xmlns:a16="http://schemas.microsoft.com/office/drawing/2014/main" id="{205324EE-49D7-9830-9473-11F4C620AAFA}"/>
+              </a:ext>
+            </a:extLst>
+          </p:cNvPr>
+          <p:cNvSpPr txBox="1">
+            <a:spLocks/>
+          </p:cNvSpPr>
+          <p:nvPr/>
+        </p:nvSpPr>
+        <p:spPr>
+          <a:xfrm>
+            <a:off x="7844882" y="1665211"/>
+            <a:ext cx="3830444" cy="2222268"/>
+          </a:xfrm>
+          <a:prstGeom prst="rect">
+            <a:avLst/>
+          </a:prstGeom>
+        </p:spPr>
+        <p:txBody>
+          <a:bodyPr vert="horz" lIns="91440" tIns="45720" rIns="91440" bIns="45720" rtlCol="0">
+            <a:normAutofit/>
+          </a:bodyPr>
+          <a:lstStyle>
+            <a:lvl1pPr marL="228600" indent="-228600" algn="l" defTabSz="914400" rtl="0" eaLnBrk="1" latinLnBrk="0" hangingPunct="1">
+              <a:lnSpc>
+                <a:spcPct val="90000"/>
+              </a:lnSpc>
+              <a:spcBef>
+                <a:spcPts val="1000"/>
+              </a:spcBef>
+              <a:buFont typeface="Arial" panose="020B0604020202020204" pitchFamily="34" charset="0"/>
+              <a:buChar char="•"/>
+              <a:defRPr sz="2800" kern="1200">
+                <a:solidFill>
+                  <a:schemeClr val="tx1"/>
+                </a:solidFill>
+                <a:latin typeface="+mn-lt"/>
+                <a:ea typeface="+mn-ea"/>
+                <a:cs typeface="+mn-cs"/>
+              </a:defRPr>
+            </a:lvl1pPr>
+            <a:lvl2pPr marL="685800" indent="-228600" algn="l" defTabSz="914400" rtl="0" eaLnBrk="1" latinLnBrk="0" hangingPunct="1">
+              <a:lnSpc>
+                <a:spcPct val="90000"/>
+              </a:lnSpc>
+              <a:spcBef>
+                <a:spcPts val="500"/>
+              </a:spcBef>
+              <a:buFont typeface="Arial" panose="020B0604020202020204" pitchFamily="34" charset="0"/>
+              <a:buChar char="•"/>
+              <a:defRPr sz="2400" kern="1200">
+                <a:solidFill>
+                  <a:schemeClr val="tx1"/>
+                </a:solidFill>
+                <a:latin typeface="+mn-lt"/>
+                <a:ea typeface="+mn-ea"/>
+                <a:cs typeface="+mn-cs"/>
+              </a:defRPr>
+            </a:lvl2pPr>
+            <a:lvl3pPr marL="1143000" indent="-228600" algn="l" defTabSz="914400" rtl="0" eaLnBrk="1" latinLnBrk="0" hangingPunct="1">
+              <a:lnSpc>
+                <a:spcPct val="90000"/>
+              </a:lnSpc>
+              <a:spcBef>
+                <a:spcPts val="500"/>
+              </a:spcBef>
+              <a:buFont typeface="Arial" panose="020B0604020202020204" pitchFamily="34" charset="0"/>
+              <a:buChar char="•"/>
+              <a:defRPr sz="2000" kern="1200">
+                <a:solidFill>
+                  <a:schemeClr val="tx1"/>
+                </a:solidFill>
+                <a:latin typeface="+mn-lt"/>
+                <a:ea typeface="+mn-ea"/>
+                <a:cs typeface="+mn-cs"/>
+              </a:defRPr>
+            </a:lvl3pPr>
+            <a:lvl4pPr marL="1600200" indent="-228600" algn="l" defTabSz="914400" rtl="0" eaLnBrk="1" latinLnBrk="0" hangingPunct="1">
+              <a:lnSpc>
+                <a:spcPct val="90000"/>
+              </a:lnSpc>
+              <a:spcBef>
+                <a:spcPts val="500"/>
+              </a:spcBef>
+              <a:buFont typeface="Arial" panose="020B0604020202020204" pitchFamily="34" charset="0"/>
+              <a:buChar char="•"/>
+              <a:defRPr sz="1800" kern="1200">
+                <a:solidFill>
+                  <a:schemeClr val="tx1"/>
+                </a:solidFill>
+                <a:latin typeface="+mn-lt"/>
+                <a:ea typeface="+mn-ea"/>
+                <a:cs typeface="+mn-cs"/>
+              </a:defRPr>
+            </a:lvl4pPr>
+            <a:lvl5pPr marL="2057400" indent="-228600" algn="l" defTabSz="914400" rtl="0" eaLnBrk="1" latinLnBrk="0" hangingPunct="1">
+              <a:lnSpc>
+                <a:spcPct val="90000"/>
+              </a:lnSpc>
+              <a:spcBef>
+                <a:spcPts val="500"/>
+              </a:spcBef>
+              <a:buFont typeface="Arial" panose="020B0604020202020204" pitchFamily="34" charset="0"/>
+              <a:buChar char="•"/>
+              <a:defRPr sz="1800" kern="1200">
+                <a:solidFill>
+                  <a:schemeClr val="tx1"/>
+                </a:solidFill>
+                <a:latin typeface="+mn-lt"/>
+                <a:ea typeface="+mn-ea"/>
+                <a:cs typeface="+mn-cs"/>
+              </a:defRPr>
+            </a:lvl5pPr>
+            <a:lvl6pPr marL="2514600" indent="-228600" algn="l" defTabSz="914400" rtl="0" eaLnBrk="1" latinLnBrk="0" hangingPunct="1">
+              <a:lnSpc>
+                <a:spcPct val="90000"/>
+              </a:lnSpc>
+              <a:spcBef>
+                <a:spcPts val="500"/>
+              </a:spcBef>
+              <a:buFont typeface="Arial" panose="020B0604020202020204" pitchFamily="34" charset="0"/>
+              <a:buChar char="•"/>
+              <a:defRPr sz="1800" kern="1200">
+                <a:solidFill>
+                  <a:schemeClr val="tx1"/>
+                </a:solidFill>
+                <a:latin typeface="+mn-lt"/>
+                <a:ea typeface="+mn-ea"/>
+                <a:cs typeface="+mn-cs"/>
+              </a:defRPr>
+            </a:lvl6pPr>
+            <a:lvl7pPr marL="2971800" indent="-228600" algn="l" defTabSz="914400" rtl="0" eaLnBrk="1" latinLnBrk="0" hangingPunct="1">
+              <a:lnSpc>
+                <a:spcPct val="90000"/>
+              </a:lnSpc>
+              <a:spcBef>
+                <a:spcPts val="500"/>
+              </a:spcBef>
+              <a:buFont typeface="Arial" panose="020B0604020202020204" pitchFamily="34" charset="0"/>
+              <a:buChar char="•"/>
+              <a:defRPr sz="1800" kern="1200">
+                <a:solidFill>
+                  <a:schemeClr val="tx1"/>
+                </a:solidFill>
+                <a:latin typeface="+mn-lt"/>
+                <a:ea typeface="+mn-ea"/>
+                <a:cs typeface="+mn-cs"/>
+              </a:defRPr>
+            </a:lvl7pPr>
+            <a:lvl8pPr marL="3429000" indent="-228600" algn="l" defTabSz="914400" rtl="0" eaLnBrk="1" latinLnBrk="0" hangingPunct="1">
+              <a:lnSpc>
+                <a:spcPct val="90000"/>
+              </a:lnSpc>
+              <a:spcBef>
+                <a:spcPts val="500"/>
+              </a:spcBef>
+              <a:buFont typeface="Arial" panose="020B0604020202020204" pitchFamily="34" charset="0"/>
+              <a:buChar char="•"/>
+              <a:defRPr sz="1800" kern="1200">
+                <a:solidFill>
+                  <a:schemeClr val="tx1"/>
+                </a:solidFill>
+                <a:latin typeface="+mn-lt"/>
+                <a:ea typeface="+mn-ea"/>
+                <a:cs typeface="+mn-cs"/>
+              </a:defRPr>
+            </a:lvl8pPr>
+            <a:lvl9pPr marL="3886200" indent="-228600" algn="l" defTabSz="914400" rtl="0" eaLnBrk="1" latinLnBrk="0" hangingPunct="1">
+              <a:lnSpc>
+                <a:spcPct val="90000"/>
+              </a:lnSpc>
+              <a:spcBef>
+                <a:spcPts val="500"/>
+              </a:spcBef>
+              <a:buFont typeface="Arial" panose="020B0604020202020204" pitchFamily="34" charset="0"/>
+              <a:buChar char="•"/>
+              <a:defRPr sz="1800" kern="1200">
+                <a:solidFill>
+                  <a:schemeClr val="tx1"/>
+                </a:solidFill>
+                <a:latin typeface="+mn-lt"/>
+                <a:ea typeface="+mn-ea"/>
+                <a:cs typeface="+mn-cs"/>
+              </a:defRPr>
+            </a:lvl9pPr>
+          </a:lstStyle>
+          <a:p>
+            <a:pPr marL="0" indent="0" algn="ctr">
+              <a:buFont typeface="Arial" panose="020B0604020202020204" pitchFamily="34" charset="0"/>
+              <a:buNone/>
+            </a:pPr>
+            <a:r>
+              <a:rPr lang="fr-FR" sz="1600" b="1" dirty="0"/>
+              <a:t>SOCIAL</a:t>
+            </a:r>
+          </a:p>
+          <a:p>
+            <a:r>
+              <a:rPr lang="fr-FR" sz="1600" dirty="0"/>
+              <a:t>Croissance des </a:t>
+            </a:r>
+            <a:r>
+              <a:rPr lang="fr-FR" sz="1600" dirty="0" err="1"/>
+              <a:t>DINK</a:t>
+            </a:r>
+            <a:endParaRPr lang="fr-FR" sz="1600" dirty="0"/>
+          </a:p>
+          <a:p>
+            <a:r>
+              <a:rPr lang="fr-FR" sz="1600" dirty="0"/>
+              <a:t>Congés payées en France</a:t>
+            </a:r>
+          </a:p>
+          <a:p>
+            <a:r>
+              <a:rPr lang="fr-FR" sz="1600" dirty="0"/>
+              <a:t>Mode de vie</a:t>
+            </a:r>
+          </a:p>
+          <a:p>
+            <a:r>
+              <a:rPr lang="fr-FR" sz="1600" dirty="0"/>
+              <a:t>Rapport vie perso/travail</a:t>
+            </a:r>
+          </a:p>
+          <a:p>
+            <a:r>
+              <a:rPr lang="fr-FR" sz="1600" dirty="0"/>
+              <a:t>Prise de conscience écologique</a:t>
+            </a:r>
+          </a:p>
+          <a:p>
+            <a:endParaRPr lang="fr-FR" sz="1600" dirty="0"/>
+          </a:p>
+        </p:txBody>
+      </p:sp>
+      <p:sp>
+        <p:nvSpPr>
+          <p:cNvPr id="6" name="Espace réservé du contenu 2">
+            <a:extLst>
+              <a:ext uri="{FF2B5EF4-FFF2-40B4-BE49-F238E27FC236}">
+                <a16:creationId xmlns:a16="http://schemas.microsoft.com/office/drawing/2014/main" id="{577C0C02-6669-15E6-B9A0-FF22E24BA7AD}"/>
+              </a:ext>
+            </a:extLst>
+          </p:cNvPr>
+          <p:cNvSpPr txBox="1">
+            <a:spLocks/>
+          </p:cNvSpPr>
+          <p:nvPr/>
+        </p:nvSpPr>
+        <p:spPr>
+          <a:xfrm>
+            <a:off x="838200" y="4682331"/>
+            <a:ext cx="2763644" cy="1183210"/>
+          </a:xfrm>
+          <a:prstGeom prst="rect">
+            <a:avLst/>
+          </a:prstGeom>
+        </p:spPr>
+        <p:txBody>
+          <a:bodyPr vert="horz" lIns="91440" tIns="45720" rIns="91440" bIns="45720" rtlCol="0">
+            <a:normAutofit/>
+          </a:bodyPr>
+          <a:lstStyle>
+            <a:lvl1pPr marL="228600" indent="-228600" algn="l" defTabSz="914400" rtl="0" eaLnBrk="1" latinLnBrk="0" hangingPunct="1">
+              <a:lnSpc>
+                <a:spcPct val="90000"/>
+              </a:lnSpc>
+              <a:spcBef>
+                <a:spcPts val="1000"/>
+              </a:spcBef>
+              <a:buFont typeface="Arial" panose="020B0604020202020204" pitchFamily="34" charset="0"/>
+              <a:buChar char="•"/>
+              <a:defRPr sz="2800" kern="1200">
+                <a:solidFill>
+                  <a:schemeClr val="tx1"/>
+                </a:solidFill>
+                <a:latin typeface="+mn-lt"/>
+                <a:ea typeface="+mn-ea"/>
+                <a:cs typeface="+mn-cs"/>
+              </a:defRPr>
+            </a:lvl1pPr>
+            <a:lvl2pPr marL="685800" indent="-228600" algn="l" defTabSz="914400" rtl="0" eaLnBrk="1" latinLnBrk="0" hangingPunct="1">
+              <a:lnSpc>
+                <a:spcPct val="90000"/>
+              </a:lnSpc>
+              <a:spcBef>
+                <a:spcPts val="500"/>
+              </a:spcBef>
+              <a:buFont typeface="Arial" panose="020B0604020202020204" pitchFamily="34" charset="0"/>
+              <a:buChar char="•"/>
+              <a:defRPr sz="2400" kern="1200">
+                <a:solidFill>
+                  <a:schemeClr val="tx1"/>
+                </a:solidFill>
+                <a:latin typeface="+mn-lt"/>
+                <a:ea typeface="+mn-ea"/>
+                <a:cs typeface="+mn-cs"/>
+              </a:defRPr>
+            </a:lvl2pPr>
+            <a:lvl3pPr marL="1143000" indent="-228600" algn="l" defTabSz="914400" rtl="0" eaLnBrk="1" latinLnBrk="0" hangingPunct="1">
+              <a:lnSpc>
+                <a:spcPct val="90000"/>
+              </a:lnSpc>
+              <a:spcBef>
+                <a:spcPts val="500"/>
+              </a:spcBef>
+              <a:buFont typeface="Arial" panose="020B0604020202020204" pitchFamily="34" charset="0"/>
+              <a:buChar char="•"/>
+              <a:defRPr sz="2000" kern="1200">
+                <a:solidFill>
+                  <a:schemeClr val="tx1"/>
+                </a:solidFill>
+                <a:latin typeface="+mn-lt"/>
+                <a:ea typeface="+mn-ea"/>
+                <a:cs typeface="+mn-cs"/>
+              </a:defRPr>
+            </a:lvl3pPr>
+            <a:lvl4pPr marL="1600200" indent="-228600" algn="l" defTabSz="914400" rtl="0" eaLnBrk="1" latinLnBrk="0" hangingPunct="1">
+              <a:lnSpc>
+                <a:spcPct val="90000"/>
+              </a:lnSpc>
+              <a:spcBef>
+                <a:spcPts val="500"/>
+              </a:spcBef>
+              <a:buFont typeface="Arial" panose="020B0604020202020204" pitchFamily="34" charset="0"/>
+              <a:buChar char="•"/>
+              <a:defRPr sz="1800" kern="1200">
+                <a:solidFill>
+                  <a:schemeClr val="tx1"/>
+                </a:solidFill>
+                <a:latin typeface="+mn-lt"/>
+                <a:ea typeface="+mn-ea"/>
+                <a:cs typeface="+mn-cs"/>
+              </a:defRPr>
+            </a:lvl4pPr>
+            <a:lvl5pPr marL="2057400" indent="-228600" algn="l" defTabSz="914400" rtl="0" eaLnBrk="1" latinLnBrk="0" hangingPunct="1">
+              <a:lnSpc>
+                <a:spcPct val="90000"/>
+              </a:lnSpc>
+              <a:spcBef>
+                <a:spcPts val="500"/>
+              </a:spcBef>
+              <a:buFont typeface="Arial" panose="020B0604020202020204" pitchFamily="34" charset="0"/>
+              <a:buChar char="•"/>
+              <a:defRPr sz="1800" kern="1200">
+                <a:solidFill>
+                  <a:schemeClr val="tx1"/>
+                </a:solidFill>
+                <a:latin typeface="+mn-lt"/>
+                <a:ea typeface="+mn-ea"/>
+                <a:cs typeface="+mn-cs"/>
+              </a:defRPr>
+            </a:lvl5pPr>
+            <a:lvl6pPr marL="2514600" indent="-228600" algn="l" defTabSz="914400" rtl="0" eaLnBrk="1" latinLnBrk="0" hangingPunct="1">
+              <a:lnSpc>
+                <a:spcPct val="90000"/>
+              </a:lnSpc>
+              <a:spcBef>
+                <a:spcPts val="500"/>
+              </a:spcBef>
+              <a:buFont typeface="Arial" panose="020B0604020202020204" pitchFamily="34" charset="0"/>
+              <a:buChar char="•"/>
+              <a:defRPr sz="1800" kern="1200">
+                <a:solidFill>
+                  <a:schemeClr val="tx1"/>
+                </a:solidFill>
+                <a:latin typeface="+mn-lt"/>
+                <a:ea typeface="+mn-ea"/>
+                <a:cs typeface="+mn-cs"/>
+              </a:defRPr>
+            </a:lvl6pPr>
+            <a:lvl7pPr marL="2971800" indent="-228600" algn="l" defTabSz="914400" rtl="0" eaLnBrk="1" latinLnBrk="0" hangingPunct="1">
+              <a:lnSpc>
+                <a:spcPct val="90000"/>
+              </a:lnSpc>
+              <a:spcBef>
+                <a:spcPts val="500"/>
+              </a:spcBef>
+              <a:buFont typeface="Arial" panose="020B0604020202020204" pitchFamily="34" charset="0"/>
+              <a:buChar char="•"/>
+              <a:defRPr sz="1800" kern="1200">
+                <a:solidFill>
+                  <a:schemeClr val="tx1"/>
+                </a:solidFill>
+                <a:latin typeface="+mn-lt"/>
+                <a:ea typeface="+mn-ea"/>
+                <a:cs typeface="+mn-cs"/>
+              </a:defRPr>
+            </a:lvl7pPr>
+            <a:lvl8pPr marL="3429000" indent="-228600" algn="l" defTabSz="914400" rtl="0" eaLnBrk="1" latinLnBrk="0" hangingPunct="1">
+              <a:lnSpc>
+                <a:spcPct val="90000"/>
+              </a:lnSpc>
+              <a:spcBef>
+                <a:spcPts val="500"/>
+              </a:spcBef>
+              <a:buFont typeface="Arial" panose="020B0604020202020204" pitchFamily="34" charset="0"/>
+              <a:buChar char="•"/>
+              <a:defRPr sz="1800" kern="1200">
+                <a:solidFill>
+                  <a:schemeClr val="tx1"/>
+                </a:solidFill>
+                <a:latin typeface="+mn-lt"/>
+                <a:ea typeface="+mn-ea"/>
+                <a:cs typeface="+mn-cs"/>
+              </a:defRPr>
+            </a:lvl8pPr>
+            <a:lvl9pPr marL="3886200" indent="-228600" algn="l" defTabSz="914400" rtl="0" eaLnBrk="1" latinLnBrk="0" hangingPunct="1">
+              <a:lnSpc>
+                <a:spcPct val="90000"/>
+              </a:lnSpc>
+              <a:spcBef>
+                <a:spcPts val="500"/>
+              </a:spcBef>
+              <a:buFont typeface="Arial" panose="020B0604020202020204" pitchFamily="34" charset="0"/>
+              <a:buChar char="•"/>
+              <a:defRPr sz="1800" kern="1200">
+                <a:solidFill>
+                  <a:schemeClr val="tx1"/>
+                </a:solidFill>
+                <a:latin typeface="+mn-lt"/>
+                <a:ea typeface="+mn-ea"/>
+                <a:cs typeface="+mn-cs"/>
+              </a:defRPr>
+            </a:lvl9pPr>
+          </a:lstStyle>
+          <a:p>
+            <a:pPr marL="0" indent="0" algn="ctr">
+              <a:buFont typeface="Arial" panose="020B0604020202020204" pitchFamily="34" charset="0"/>
+              <a:buNone/>
+            </a:pPr>
+            <a:r>
+              <a:rPr lang="fr-FR" sz="1600" dirty="0"/>
+              <a:t>TECHNOLOGIQUE</a:t>
+            </a:r>
+          </a:p>
+          <a:p>
+            <a:r>
+              <a:rPr lang="fr-FR" sz="1600" dirty="0"/>
+              <a:t>Accès à internet</a:t>
+            </a:r>
+          </a:p>
+          <a:p>
+            <a:r>
+              <a:rPr lang="fr-FR" sz="1600" dirty="0"/>
+              <a:t>Développement de l’IA</a:t>
+            </a:r>
+          </a:p>
+        </p:txBody>
+      </p:sp>
+      <p:sp>
+        <p:nvSpPr>
+          <p:cNvPr id="7" name="Espace réservé du contenu 2">
+            <a:extLst>
+              <a:ext uri="{FF2B5EF4-FFF2-40B4-BE49-F238E27FC236}">
+                <a16:creationId xmlns:a16="http://schemas.microsoft.com/office/drawing/2014/main" id="{B2C657E2-9E9D-B285-185A-622902A87C2D}"/>
+              </a:ext>
+            </a:extLst>
+          </p:cNvPr>
+          <p:cNvSpPr txBox="1">
+            <a:spLocks/>
+          </p:cNvSpPr>
+          <p:nvPr/>
+        </p:nvSpPr>
+        <p:spPr>
+          <a:xfrm>
+            <a:off x="4668644" y="2787767"/>
+            <a:ext cx="2646556" cy="1260126"/>
+          </a:xfrm>
+          <a:prstGeom prst="rect">
+            <a:avLst/>
+          </a:prstGeom>
+        </p:spPr>
+        <p:txBody>
+          <a:bodyPr vert="horz" lIns="91440" tIns="45720" rIns="91440" bIns="45720" rtlCol="0">
+            <a:normAutofit/>
+          </a:bodyPr>
+          <a:lstStyle>
+            <a:lvl1pPr marL="228600" indent="-228600" algn="l" defTabSz="914400" rtl="0" eaLnBrk="1" latinLnBrk="0" hangingPunct="1">
+              <a:lnSpc>
+                <a:spcPct val="90000"/>
+              </a:lnSpc>
+              <a:spcBef>
+                <a:spcPts val="1000"/>
+              </a:spcBef>
+              <a:buFont typeface="Arial" panose="020B0604020202020204" pitchFamily="34" charset="0"/>
+              <a:buChar char="•"/>
+              <a:defRPr sz="2800" kern="1200">
+                <a:solidFill>
+                  <a:schemeClr val="tx1"/>
+                </a:solidFill>
+                <a:latin typeface="+mn-lt"/>
+                <a:ea typeface="+mn-ea"/>
+                <a:cs typeface="+mn-cs"/>
+              </a:defRPr>
+            </a:lvl1pPr>
+            <a:lvl2pPr marL="685800" indent="-228600" algn="l" defTabSz="914400" rtl="0" eaLnBrk="1" latinLnBrk="0" hangingPunct="1">
+              <a:lnSpc>
+                <a:spcPct val="90000"/>
+              </a:lnSpc>
+              <a:spcBef>
+                <a:spcPts val="500"/>
+              </a:spcBef>
+              <a:buFont typeface="Arial" panose="020B0604020202020204" pitchFamily="34" charset="0"/>
+              <a:buChar char="•"/>
+              <a:defRPr sz="2400" kern="1200">
+                <a:solidFill>
+                  <a:schemeClr val="tx1"/>
+                </a:solidFill>
+                <a:latin typeface="+mn-lt"/>
+                <a:ea typeface="+mn-ea"/>
+                <a:cs typeface="+mn-cs"/>
+              </a:defRPr>
+            </a:lvl2pPr>
+            <a:lvl3pPr marL="1143000" indent="-228600" algn="l" defTabSz="914400" rtl="0" eaLnBrk="1" latinLnBrk="0" hangingPunct="1">
+              <a:lnSpc>
+                <a:spcPct val="90000"/>
+              </a:lnSpc>
+              <a:spcBef>
+                <a:spcPts val="500"/>
+              </a:spcBef>
+              <a:buFont typeface="Arial" panose="020B0604020202020204" pitchFamily="34" charset="0"/>
+              <a:buChar char="•"/>
+              <a:defRPr sz="2000" kern="1200">
+                <a:solidFill>
+                  <a:schemeClr val="tx1"/>
+                </a:solidFill>
+                <a:latin typeface="+mn-lt"/>
+                <a:ea typeface="+mn-ea"/>
+                <a:cs typeface="+mn-cs"/>
+              </a:defRPr>
+            </a:lvl3pPr>
+            <a:lvl4pPr marL="1600200" indent="-228600" algn="l" defTabSz="914400" rtl="0" eaLnBrk="1" latinLnBrk="0" hangingPunct="1">
+              <a:lnSpc>
+                <a:spcPct val="90000"/>
+              </a:lnSpc>
+              <a:spcBef>
+                <a:spcPts val="500"/>
+              </a:spcBef>
+              <a:buFont typeface="Arial" panose="020B0604020202020204" pitchFamily="34" charset="0"/>
+              <a:buChar char="•"/>
+              <a:defRPr sz="1800" kern="1200">
+                <a:solidFill>
+                  <a:schemeClr val="tx1"/>
+                </a:solidFill>
+                <a:latin typeface="+mn-lt"/>
+                <a:ea typeface="+mn-ea"/>
+                <a:cs typeface="+mn-cs"/>
+              </a:defRPr>
+            </a:lvl4pPr>
+            <a:lvl5pPr marL="2057400" indent="-228600" algn="l" defTabSz="914400" rtl="0" eaLnBrk="1" latinLnBrk="0" hangingPunct="1">
+              <a:lnSpc>
+                <a:spcPct val="90000"/>
+              </a:lnSpc>
+              <a:spcBef>
+                <a:spcPts val="500"/>
+              </a:spcBef>
+              <a:buFont typeface="Arial" panose="020B0604020202020204" pitchFamily="34" charset="0"/>
+              <a:buChar char="•"/>
+              <a:defRPr sz="1800" kern="1200">
+                <a:solidFill>
+                  <a:schemeClr val="tx1"/>
+                </a:solidFill>
+                <a:latin typeface="+mn-lt"/>
+                <a:ea typeface="+mn-ea"/>
+                <a:cs typeface="+mn-cs"/>
+              </a:defRPr>
+            </a:lvl5pPr>
+            <a:lvl6pPr marL="2514600" indent="-228600" algn="l" defTabSz="914400" rtl="0" eaLnBrk="1" latinLnBrk="0" hangingPunct="1">
+              <a:lnSpc>
+                <a:spcPct val="90000"/>
+              </a:lnSpc>
+              <a:spcBef>
+                <a:spcPts val="500"/>
+              </a:spcBef>
+              <a:buFont typeface="Arial" panose="020B0604020202020204" pitchFamily="34" charset="0"/>
+              <a:buChar char="•"/>
+              <a:defRPr sz="1800" kern="1200">
+                <a:solidFill>
+                  <a:schemeClr val="tx1"/>
+                </a:solidFill>
+                <a:latin typeface="+mn-lt"/>
+                <a:ea typeface="+mn-ea"/>
+                <a:cs typeface="+mn-cs"/>
+              </a:defRPr>
+            </a:lvl6pPr>
+            <a:lvl7pPr marL="2971800" indent="-228600" algn="l" defTabSz="914400" rtl="0" eaLnBrk="1" latinLnBrk="0" hangingPunct="1">
+              <a:lnSpc>
+                <a:spcPct val="90000"/>
+              </a:lnSpc>
+              <a:spcBef>
+                <a:spcPts val="500"/>
+              </a:spcBef>
+              <a:buFont typeface="Arial" panose="020B0604020202020204" pitchFamily="34" charset="0"/>
+              <a:buChar char="•"/>
+              <a:defRPr sz="1800" kern="1200">
+                <a:solidFill>
+                  <a:schemeClr val="tx1"/>
+                </a:solidFill>
+                <a:latin typeface="+mn-lt"/>
+                <a:ea typeface="+mn-ea"/>
+                <a:cs typeface="+mn-cs"/>
+              </a:defRPr>
+            </a:lvl7pPr>
+            <a:lvl8pPr marL="3429000" indent="-228600" algn="l" defTabSz="914400" rtl="0" eaLnBrk="1" latinLnBrk="0" hangingPunct="1">
+              <a:lnSpc>
+                <a:spcPct val="90000"/>
+              </a:lnSpc>
+              <a:spcBef>
+                <a:spcPts val="500"/>
+              </a:spcBef>
+              <a:buFont typeface="Arial" panose="020B0604020202020204" pitchFamily="34" charset="0"/>
+              <a:buChar char="•"/>
+              <a:defRPr sz="1800" kern="1200">
+                <a:solidFill>
+                  <a:schemeClr val="tx1"/>
+                </a:solidFill>
+                <a:latin typeface="+mn-lt"/>
+                <a:ea typeface="+mn-ea"/>
+                <a:cs typeface="+mn-cs"/>
+              </a:defRPr>
+            </a:lvl8pPr>
+            <a:lvl9pPr marL="3886200" indent="-228600" algn="l" defTabSz="914400" rtl="0" eaLnBrk="1" latinLnBrk="0" hangingPunct="1">
+              <a:lnSpc>
+                <a:spcPct val="90000"/>
+              </a:lnSpc>
+              <a:spcBef>
+                <a:spcPts val="500"/>
+              </a:spcBef>
+              <a:buFont typeface="Arial" panose="020B0604020202020204" pitchFamily="34" charset="0"/>
+              <a:buChar char="•"/>
+              <a:defRPr sz="1800" kern="1200">
+                <a:solidFill>
+                  <a:schemeClr val="tx1"/>
+                </a:solidFill>
+                <a:latin typeface="+mn-lt"/>
+                <a:ea typeface="+mn-ea"/>
+                <a:cs typeface="+mn-cs"/>
+              </a:defRPr>
+            </a:lvl9pPr>
+          </a:lstStyle>
+          <a:p>
+            <a:pPr marL="0" indent="0" algn="ctr">
+              <a:buFont typeface="Arial" panose="020B0604020202020204" pitchFamily="34" charset="0"/>
+              <a:buNone/>
+            </a:pPr>
+            <a:r>
+              <a:rPr lang="fr-FR" sz="1600" dirty="0"/>
+              <a:t>ENVIRONNEMENT</a:t>
+            </a:r>
+          </a:p>
+          <a:p>
+            <a:r>
+              <a:rPr lang="fr-FR" sz="1600" dirty="0"/>
+              <a:t>Réchauffement climatique</a:t>
+            </a:r>
+          </a:p>
+          <a:p>
+            <a:r>
+              <a:rPr lang="fr-FR" sz="1600" dirty="0"/>
+              <a:t>Pollution de l’IA</a:t>
+            </a:r>
+          </a:p>
+          <a:p>
+            <a:pPr marL="0" indent="0">
+              <a:buNone/>
+            </a:pPr>
+            <a:endParaRPr lang="fr-FR" sz="1600" dirty="0"/>
+          </a:p>
+        </p:txBody>
+      </p:sp>
+      <p:sp>
+        <p:nvSpPr>
+          <p:cNvPr id="8" name="Espace réservé du contenu 2">
+            <a:extLst>
+              <a:ext uri="{FF2B5EF4-FFF2-40B4-BE49-F238E27FC236}">
+                <a16:creationId xmlns:a16="http://schemas.microsoft.com/office/drawing/2014/main" id="{6E72FA1D-81CF-D570-0562-051FB00D9942}"/>
+              </a:ext>
+            </a:extLst>
+          </p:cNvPr>
+          <p:cNvSpPr txBox="1">
+            <a:spLocks/>
+          </p:cNvSpPr>
+          <p:nvPr/>
+        </p:nvSpPr>
+        <p:spPr>
+          <a:xfrm>
+            <a:off x="4995746" y="4978855"/>
+            <a:ext cx="3033132" cy="1554036"/>
+          </a:xfrm>
+          <a:prstGeom prst="rect">
+            <a:avLst/>
+          </a:prstGeom>
+        </p:spPr>
+        <p:txBody>
+          <a:bodyPr vert="horz" lIns="91440" tIns="45720" rIns="91440" bIns="45720" rtlCol="0">
+            <a:normAutofit fontScale="92500" lnSpcReduction="10000"/>
+          </a:bodyPr>
+          <a:lstStyle>
+            <a:lvl1pPr marL="228600" indent="-228600" algn="l" defTabSz="914400" rtl="0" eaLnBrk="1" latinLnBrk="0" hangingPunct="1">
+              <a:lnSpc>
+                <a:spcPct val="90000"/>
+              </a:lnSpc>
+              <a:spcBef>
+                <a:spcPts val="1000"/>
+              </a:spcBef>
+              <a:buFont typeface="Arial" panose="020B0604020202020204" pitchFamily="34" charset="0"/>
+              <a:buChar char="•"/>
+              <a:defRPr sz="2800" kern="1200">
+                <a:solidFill>
+                  <a:schemeClr val="tx1"/>
+                </a:solidFill>
+                <a:latin typeface="+mn-lt"/>
+                <a:ea typeface="+mn-ea"/>
+                <a:cs typeface="+mn-cs"/>
+              </a:defRPr>
+            </a:lvl1pPr>
+            <a:lvl2pPr marL="685800" indent="-228600" algn="l" defTabSz="914400" rtl="0" eaLnBrk="1" latinLnBrk="0" hangingPunct="1">
+              <a:lnSpc>
+                <a:spcPct val="90000"/>
+              </a:lnSpc>
+              <a:spcBef>
+                <a:spcPts val="500"/>
+              </a:spcBef>
+              <a:buFont typeface="Arial" panose="020B0604020202020204" pitchFamily="34" charset="0"/>
+              <a:buChar char="•"/>
+              <a:defRPr sz="2400" kern="1200">
+                <a:solidFill>
+                  <a:schemeClr val="tx1"/>
+                </a:solidFill>
+                <a:latin typeface="+mn-lt"/>
+                <a:ea typeface="+mn-ea"/>
+                <a:cs typeface="+mn-cs"/>
+              </a:defRPr>
+            </a:lvl2pPr>
+            <a:lvl3pPr marL="1143000" indent="-228600" algn="l" defTabSz="914400" rtl="0" eaLnBrk="1" latinLnBrk="0" hangingPunct="1">
+              <a:lnSpc>
+                <a:spcPct val="90000"/>
+              </a:lnSpc>
+              <a:spcBef>
+                <a:spcPts val="500"/>
+              </a:spcBef>
+              <a:buFont typeface="Arial" panose="020B0604020202020204" pitchFamily="34" charset="0"/>
+              <a:buChar char="•"/>
+              <a:defRPr sz="2000" kern="1200">
+                <a:solidFill>
+                  <a:schemeClr val="tx1"/>
+                </a:solidFill>
+                <a:latin typeface="+mn-lt"/>
+                <a:ea typeface="+mn-ea"/>
+                <a:cs typeface="+mn-cs"/>
+              </a:defRPr>
+            </a:lvl3pPr>
+            <a:lvl4pPr marL="1600200" indent="-228600" algn="l" defTabSz="914400" rtl="0" eaLnBrk="1" latinLnBrk="0" hangingPunct="1">
+              <a:lnSpc>
+                <a:spcPct val="90000"/>
+              </a:lnSpc>
+              <a:spcBef>
+                <a:spcPts val="500"/>
+              </a:spcBef>
+              <a:buFont typeface="Arial" panose="020B0604020202020204" pitchFamily="34" charset="0"/>
+              <a:buChar char="•"/>
+              <a:defRPr sz="1800" kern="1200">
+                <a:solidFill>
+                  <a:schemeClr val="tx1"/>
+                </a:solidFill>
+                <a:latin typeface="+mn-lt"/>
+                <a:ea typeface="+mn-ea"/>
+                <a:cs typeface="+mn-cs"/>
+              </a:defRPr>
+            </a:lvl4pPr>
+            <a:lvl5pPr marL="2057400" indent="-228600" algn="l" defTabSz="914400" rtl="0" eaLnBrk="1" latinLnBrk="0" hangingPunct="1">
+              <a:lnSpc>
+                <a:spcPct val="90000"/>
+              </a:lnSpc>
+              <a:spcBef>
+                <a:spcPts val="500"/>
+              </a:spcBef>
+              <a:buFont typeface="Arial" panose="020B0604020202020204" pitchFamily="34" charset="0"/>
+              <a:buChar char="•"/>
+              <a:defRPr sz="1800" kern="1200">
+                <a:solidFill>
+                  <a:schemeClr val="tx1"/>
+                </a:solidFill>
+                <a:latin typeface="+mn-lt"/>
+                <a:ea typeface="+mn-ea"/>
+                <a:cs typeface="+mn-cs"/>
+              </a:defRPr>
+            </a:lvl5pPr>
+            <a:lvl6pPr marL="2514600" indent="-228600" algn="l" defTabSz="914400" rtl="0" eaLnBrk="1" latinLnBrk="0" hangingPunct="1">
+              <a:lnSpc>
+                <a:spcPct val="90000"/>
+              </a:lnSpc>
+              <a:spcBef>
+                <a:spcPts val="500"/>
+              </a:spcBef>
+              <a:buFont typeface="Arial" panose="020B0604020202020204" pitchFamily="34" charset="0"/>
+              <a:buChar char="•"/>
+              <a:defRPr sz="1800" kern="1200">
+                <a:solidFill>
+                  <a:schemeClr val="tx1"/>
+                </a:solidFill>
+                <a:latin typeface="+mn-lt"/>
+                <a:ea typeface="+mn-ea"/>
+                <a:cs typeface="+mn-cs"/>
+              </a:defRPr>
+            </a:lvl6pPr>
+            <a:lvl7pPr marL="2971800" indent="-228600" algn="l" defTabSz="914400" rtl="0" eaLnBrk="1" latinLnBrk="0" hangingPunct="1">
+              <a:lnSpc>
+                <a:spcPct val="90000"/>
+              </a:lnSpc>
+              <a:spcBef>
+                <a:spcPts val="500"/>
+              </a:spcBef>
+              <a:buFont typeface="Arial" panose="020B0604020202020204" pitchFamily="34" charset="0"/>
+              <a:buChar char="•"/>
+              <a:defRPr sz="1800" kern="1200">
+                <a:solidFill>
+                  <a:schemeClr val="tx1"/>
+                </a:solidFill>
+                <a:latin typeface="+mn-lt"/>
+                <a:ea typeface="+mn-ea"/>
+                <a:cs typeface="+mn-cs"/>
+              </a:defRPr>
+            </a:lvl7pPr>
+            <a:lvl8pPr marL="3429000" indent="-228600" algn="l" defTabSz="914400" rtl="0" eaLnBrk="1" latinLnBrk="0" hangingPunct="1">
+              <a:lnSpc>
+                <a:spcPct val="90000"/>
+              </a:lnSpc>
+              <a:spcBef>
+                <a:spcPts val="500"/>
+              </a:spcBef>
+              <a:buFont typeface="Arial" panose="020B0604020202020204" pitchFamily="34" charset="0"/>
+              <a:buChar char="•"/>
+              <a:defRPr sz="1800" kern="1200">
+                <a:solidFill>
+                  <a:schemeClr val="tx1"/>
+                </a:solidFill>
+                <a:latin typeface="+mn-lt"/>
+                <a:ea typeface="+mn-ea"/>
+                <a:cs typeface="+mn-cs"/>
+              </a:defRPr>
+            </a:lvl8pPr>
+            <a:lvl9pPr marL="3886200" indent="-228600" algn="l" defTabSz="914400" rtl="0" eaLnBrk="1" latinLnBrk="0" hangingPunct="1">
+              <a:lnSpc>
+                <a:spcPct val="90000"/>
+              </a:lnSpc>
+              <a:spcBef>
+                <a:spcPts val="500"/>
+              </a:spcBef>
+              <a:buFont typeface="Arial" panose="020B0604020202020204" pitchFamily="34" charset="0"/>
+              <a:buChar char="•"/>
+              <a:defRPr sz="1800" kern="1200">
+                <a:solidFill>
+                  <a:schemeClr val="tx1"/>
+                </a:solidFill>
+                <a:latin typeface="+mn-lt"/>
+                <a:ea typeface="+mn-ea"/>
+                <a:cs typeface="+mn-cs"/>
+              </a:defRPr>
+            </a:lvl9pPr>
+          </a:lstStyle>
+          <a:p>
+            <a:pPr marL="0" indent="0" algn="ctr">
+              <a:buFont typeface="Arial" panose="020B0604020202020204" pitchFamily="34" charset="0"/>
+              <a:buNone/>
+            </a:pPr>
+            <a:r>
+              <a:rPr lang="fr-FR" sz="1600" dirty="0"/>
+              <a:t>LEGAL</a:t>
+            </a:r>
+          </a:p>
+          <a:p>
+            <a:r>
+              <a:rPr lang="fr-FR" sz="1600" dirty="0"/>
+              <a:t>Politiques environnementales</a:t>
+            </a:r>
+          </a:p>
+          <a:p>
+            <a:r>
+              <a:rPr lang="fr-FR" sz="1600" dirty="0"/>
+              <a:t>Lois sur le trafic aérien</a:t>
+            </a:r>
+          </a:p>
+          <a:p>
+            <a:r>
+              <a:rPr lang="fr-FR" sz="1600" dirty="0"/>
+              <a:t>Réglementation de l’IA</a:t>
+            </a:r>
+          </a:p>
+          <a:p>
+            <a:r>
+              <a:rPr lang="fr-FR" sz="1600" dirty="0"/>
+              <a:t>Protection des données</a:t>
+            </a:r>
+          </a:p>
+        </p:txBody>
+      </p:sp>
+    </p:spTree>
+    <p:extLst>
+      <p:ext uri="{BB962C8B-B14F-4D97-AF65-F5344CB8AC3E}">
+        <p14:creationId xmlns:p14="http://schemas.microsoft.com/office/powerpoint/2010/main" val="2926385413"/>
       </p:ext>
     </p:extLst>
   </p:cSld>

</xml_diff>